<commit_message>
Added links for games
Strong reinforcement for some basic Flex and Grid
</commit_message>
<xml_diff>
--- a/Flexbox and Grid.pptx
+++ b/Flexbox and Grid.pptx
@@ -9,6 +9,7 @@
     <p:sldId id="257" r:id="rId3"/>
     <p:sldId id="258" r:id="rId4"/>
     <p:sldId id="259" r:id="rId5"/>
+    <p:sldId id="260" r:id="rId6"/>
   </p:sldIdLst>
   <p:sldSz cx="12192000" cy="6858000"/>
   <p:notesSz cx="6858000" cy="9144000"/>
@@ -107,6 +108,11 @@
       </a:defRPr>
     </a:lvl9pPr>
   </p:defaultTextStyle>
+  <p:extLst>
+    <p:ext uri="{EFAFB233-063F-42B5-8137-9DF3F51BA10A}">
+      <p15:sldGuideLst xmlns:p15="http://schemas.microsoft.com/office/powerpoint/2012/main"/>
+    </p:ext>
+  </p:extLst>
 </p:presentation>
 </file>
 
@@ -4162,6 +4168,180 @@
 </p:sld>
 </file>
 
+<file path=ppt/slides/slide5.xml><?xml version="1.0" encoding="utf-8"?>
+<p:sld xmlns:a="http://schemas.openxmlformats.org/drawingml/2006/main" xmlns:r="http://schemas.openxmlformats.org/officeDocument/2006/relationships" xmlns:p="http://schemas.openxmlformats.org/presentationml/2006/main">
+  <p:cSld>
+    <p:spTree>
+      <p:nvGrpSpPr>
+        <p:cNvPr id="1" name=""/>
+        <p:cNvGrpSpPr/>
+        <p:nvPr/>
+      </p:nvGrpSpPr>
+      <p:grpSpPr>
+        <a:xfrm>
+          <a:off x="0" y="0"/>
+          <a:ext cx="0" cy="0"/>
+          <a:chOff x="0" y="0"/>
+          <a:chExt cx="0" cy="0"/>
+        </a:xfrm>
+      </p:grpSpPr>
+      <p:sp>
+        <p:nvSpPr>
+          <p:cNvPr id="7" name="Title 6"/>
+          <p:cNvSpPr>
+            <a:spLocks noGrp="1"/>
+          </p:cNvSpPr>
+          <p:nvPr>
+            <p:ph type="title"/>
+          </p:nvPr>
+        </p:nvSpPr>
+        <p:spPr/>
+        <p:txBody>
+          <a:bodyPr/>
+          <a:lstStyle/>
+          <a:p>
+            <a:r>
+              <a:rPr lang="en-US" dirty="0" smtClean="0"/>
+              <a:t>Resources</a:t>
+            </a:r>
+            <a:endParaRPr lang="en-US" dirty="0"/>
+          </a:p>
+        </p:txBody>
+      </p:sp>
+      <p:sp>
+        <p:nvSpPr>
+          <p:cNvPr id="8" name="Content Placeholder 7"/>
+          <p:cNvSpPr>
+            <a:spLocks noGrp="1"/>
+          </p:cNvSpPr>
+          <p:nvPr>
+            <p:ph idx="1"/>
+          </p:nvPr>
+        </p:nvSpPr>
+        <p:spPr/>
+        <p:txBody>
+          <a:bodyPr/>
+          <a:lstStyle/>
+          <a:p>
+            <a:r>
+              <a:rPr lang="en-US" dirty="0">
+                <a:hlinkClick r:id="rId2"/>
+              </a:rPr>
+              <a:t>https://</a:t>
+            </a:r>
+            <a:r>
+              <a:rPr lang="en-US" dirty="0" smtClean="0">
+                <a:hlinkClick r:id="rId2"/>
+              </a:rPr>
+              <a:t>github.com/shellwe/Flexbox_Grid</a:t>
+            </a:r>
+            <a:endParaRPr lang="en-US" dirty="0" smtClean="0"/>
+          </a:p>
+          <a:p>
+            <a:r>
+              <a:rPr lang="en-US" dirty="0">
+                <a:hlinkClick r:id="rId3"/>
+              </a:rPr>
+              <a:t>https://css-tricks.com/snippets/css/a-guide-to-flexbox</a:t>
+            </a:r>
+            <a:r>
+              <a:rPr lang="en-US" dirty="0" smtClean="0">
+                <a:hlinkClick r:id="rId3"/>
+              </a:rPr>
+              <a:t>/</a:t>
+            </a:r>
+            <a:endParaRPr lang="en-US" dirty="0" smtClean="0"/>
+          </a:p>
+          <a:p>
+            <a:r>
+              <a:rPr lang="en-US" dirty="0">
+                <a:hlinkClick r:id="rId4"/>
+              </a:rPr>
+              <a:t>http://flexboxfroggy.com</a:t>
+            </a:r>
+            <a:r>
+              <a:rPr lang="en-US" dirty="0" smtClean="0">
+                <a:hlinkClick r:id="rId4"/>
+              </a:rPr>
+              <a:t>/</a:t>
+            </a:r>
+            <a:endParaRPr lang="en-US" dirty="0" smtClean="0"/>
+          </a:p>
+          <a:p>
+            <a:r>
+              <a:rPr lang="en-US" dirty="0">
+                <a:hlinkClick r:id="rId5"/>
+              </a:rPr>
+              <a:t>https://css-tricks.com/snippets/css</a:t>
+            </a:r>
+            <a:r>
+              <a:rPr lang="en-US">
+                <a:hlinkClick r:id="rId5"/>
+              </a:rPr>
+              <a:t>/complete-guide-grid</a:t>
+            </a:r>
+            <a:r>
+              <a:rPr lang="en-US" smtClean="0">
+                <a:hlinkClick r:id="rId5"/>
+              </a:rPr>
+              <a:t>/</a:t>
+            </a:r>
+            <a:endParaRPr lang="en-US" smtClean="0"/>
+          </a:p>
+          <a:p>
+            <a:r>
+              <a:rPr lang="en-US" smtClean="0">
+                <a:hlinkClick r:id="rId6"/>
+              </a:rPr>
+              <a:t>http</a:t>
+            </a:r>
+            <a:r>
+              <a:rPr lang="en-US" dirty="0">
+                <a:hlinkClick r:id="rId6"/>
+              </a:rPr>
+              <a:t>://cssgridgarden.com</a:t>
+            </a:r>
+            <a:r>
+              <a:rPr lang="en-US" dirty="0" smtClean="0">
+                <a:hlinkClick r:id="rId6"/>
+              </a:rPr>
+              <a:t>/</a:t>
+            </a:r>
+            <a:endParaRPr lang="en-US" dirty="0" smtClean="0"/>
+          </a:p>
+          <a:p>
+            <a:r>
+              <a:rPr lang="en-US" dirty="0">
+                <a:hlinkClick r:id="rId7"/>
+              </a:rPr>
+              <a:t>https://</a:t>
+            </a:r>
+            <a:r>
+              <a:rPr lang="en-US" dirty="0" smtClean="0">
+                <a:hlinkClick r:id="rId7"/>
+              </a:rPr>
+              <a:t>tutorialzine.com/2017/03/css-grid-vs-flexbox</a:t>
+            </a:r>
+            <a:endParaRPr lang="en-US" dirty="0" smtClean="0"/>
+          </a:p>
+          <a:p>
+            <a:endParaRPr lang="en-US" dirty="0"/>
+          </a:p>
+        </p:txBody>
+      </p:sp>
+    </p:spTree>
+    <p:extLst>
+      <p:ext uri="{BB962C8B-B14F-4D97-AF65-F5344CB8AC3E}">
+        <p14:creationId xmlns:p14="http://schemas.microsoft.com/office/powerpoint/2010/main" val="1534756025"/>
+      </p:ext>
+    </p:extLst>
+  </p:cSld>
+  <p:clrMapOvr>
+    <a:masterClrMapping/>
+  </p:clrMapOvr>
+</p:sld>
+</file>
+
 <file path=ppt/theme/theme1.xml><?xml version="1.0" encoding="utf-8"?>
 <a:theme xmlns:a="http://schemas.openxmlformats.org/drawingml/2006/main" name="Crop">
   <a:themeElements>

</xml_diff>

<commit_message>
created test site and updated powerpoint
</commit_message>
<xml_diff>
--- a/Flexbox and Grid.pptx
+++ b/Flexbox and Grid.pptx
@@ -286,7 +286,7 @@
             <a:fld id="{87DE6118-2437-4B30-8E3C-4D2BE6020583}" type="datetimeFigureOut">
               <a:rPr lang="en-US" dirty="0"/>
               <a:pPr/>
-              <a:t>10/22/17</a:t>
+              <a:t>10/23/2017</a:t>
             </a:fld>
             <a:endParaRPr lang="en-US" dirty="0"/>
           </a:p>
@@ -612,7 +612,7 @@
           <a:p>
             <a:fld id="{87DE6118-2437-4B30-8E3C-4D2BE6020583}" type="datetimeFigureOut">
               <a:rPr lang="en-US" dirty="0"/>
-              <a:t>10/22/17</a:t>
+              <a:t>10/23/2017</a:t>
             </a:fld>
             <a:endParaRPr lang="en-US" dirty="0"/>
           </a:p>
@@ -787,7 +787,7 @@
           <a:p>
             <a:fld id="{87DE6118-2437-4B30-8E3C-4D2BE6020583}" type="datetimeFigureOut">
               <a:rPr lang="en-US" dirty="0"/>
-              <a:t>10/22/17</a:t>
+              <a:t>10/23/2017</a:t>
             </a:fld>
             <a:endParaRPr lang="en-US" dirty="0"/>
           </a:p>
@@ -952,7 +952,7 @@
           <a:p>
             <a:fld id="{87DE6118-2437-4B30-8E3C-4D2BE6020583}" type="datetimeFigureOut">
               <a:rPr lang="en-US" dirty="0"/>
-              <a:t>10/22/17</a:t>
+              <a:t>10/23/2017</a:t>
             </a:fld>
             <a:endParaRPr lang="en-US" dirty="0"/>
           </a:p>
@@ -1225,7 +1225,7 @@
             <a:fld id="{87DE6118-2437-4B30-8E3C-4D2BE6020583}" type="datetimeFigureOut">
               <a:rPr lang="en-US" dirty="0"/>
               <a:pPr/>
-              <a:t>10/22/17</a:t>
+              <a:t>10/23/2017</a:t>
             </a:fld>
             <a:endParaRPr lang="en-US" dirty="0"/>
           </a:p>
@@ -1615,7 +1615,7 @@
           <a:p>
             <a:fld id="{87DE6118-2437-4B30-8E3C-4D2BE6020583}" type="datetimeFigureOut">
               <a:rPr lang="en-US" dirty="0"/>
-              <a:t>10/22/17</a:t>
+              <a:t>10/23/2017</a:t>
             </a:fld>
             <a:endParaRPr lang="en-US" dirty="0"/>
           </a:p>
@@ -2087,7 +2087,7 @@
           <a:p>
             <a:fld id="{87DE6118-2437-4B30-8E3C-4D2BE6020583}" type="datetimeFigureOut">
               <a:rPr lang="en-US" dirty="0"/>
-              <a:t>10/22/17</a:t>
+              <a:t>10/23/2017</a:t>
             </a:fld>
             <a:endParaRPr lang="en-US" dirty="0"/>
           </a:p>
@@ -2200,7 +2200,7 @@
           <a:p>
             <a:fld id="{87DE6118-2437-4B30-8E3C-4D2BE6020583}" type="datetimeFigureOut">
               <a:rPr lang="en-US" dirty="0"/>
-              <a:t>10/22/17</a:t>
+              <a:t>10/23/2017</a:t>
             </a:fld>
             <a:endParaRPr lang="en-US" dirty="0"/>
           </a:p>
@@ -2290,7 +2290,7 @@
           <a:p>
             <a:fld id="{87DE6118-2437-4B30-8E3C-4D2BE6020583}" type="datetimeFigureOut">
               <a:rPr lang="en-US" dirty="0"/>
-              <a:t>10/22/17</a:t>
+              <a:t>10/23/2017</a:t>
             </a:fld>
             <a:endParaRPr lang="en-US" dirty="0"/>
           </a:p>
@@ -2632,7 +2632,7 @@
             <a:fld id="{87DE6118-2437-4B30-8E3C-4D2BE6020583}" type="datetimeFigureOut">
               <a:rPr lang="en-US" dirty="0"/>
               <a:pPr/>
-              <a:t>10/22/17</a:t>
+              <a:t>10/23/2017</a:t>
             </a:fld>
             <a:endParaRPr lang="en-US" dirty="0"/>
           </a:p>
@@ -3017,7 +3017,7 @@
             <a:fld id="{87DE6118-2437-4B30-8E3C-4D2BE6020583}" type="datetimeFigureOut">
               <a:rPr lang="en-US" dirty="0"/>
               <a:pPr/>
-              <a:t>10/22/17</a:t>
+              <a:t>10/23/2017</a:t>
             </a:fld>
             <a:endParaRPr lang="en-US" dirty="0"/>
           </a:p>
@@ -3292,7 +3292,7 @@
             <a:fld id="{87DE6118-2437-4B30-8E3C-4D2BE6020583}" type="datetimeFigureOut">
               <a:rPr lang="en-US" dirty="0"/>
               <a:pPr/>
-              <a:t>10/22/17</a:t>
+              <a:t>10/23/2017</a:t>
             </a:fld>
             <a:endParaRPr lang="en-US" dirty="0"/>
           </a:p>
@@ -4000,7 +4000,17 @@
           <a:p>
             <a:r>
               <a:rPr lang="en-US" dirty="0" smtClean="0"/>
-              <a:t>First 2 dimensional layout tool</a:t>
+              <a:t>First 2 dimensional layout </a:t>
+            </a:r>
+            <a:r>
+              <a:rPr lang="en-US" dirty="0" smtClean="0"/>
+              <a:t>tool</a:t>
+            </a:r>
+          </a:p>
+          <a:p>
+            <a:r>
+              <a:rPr lang="en-US" dirty="0" smtClean="0"/>
+              <a:t>Think tables but with CSS</a:t>
             </a:r>
             <a:endParaRPr lang="en-US" dirty="0"/>
           </a:p>
@@ -4272,34 +4282,28 @@
               <a:rPr lang="en-US" dirty="0">
                 <a:hlinkClick r:id="rId5"/>
               </a:rPr>
-              <a:t>https://css-tricks.com/snippets/css</a:t>
-            </a:r>
-            <a:r>
-              <a:rPr lang="en-US">
-                <a:hlinkClick r:id="rId5"/>
-              </a:rPr>
-              <a:t>/complete-guide-grid</a:t>
-            </a:r>
-            <a:r>
-              <a:rPr lang="en-US" smtClean="0">
+              <a:t>https://gridbyexample.com</a:t>
+            </a:r>
+            <a:r>
+              <a:rPr lang="en-US" dirty="0" smtClean="0">
                 <a:hlinkClick r:id="rId5"/>
               </a:rPr>
               <a:t>/</a:t>
             </a:r>
-            <a:endParaRPr lang="en-US" smtClean="0"/>
-          </a:p>
-          <a:p>
-            <a:r>
-              <a:rPr lang="en-US" smtClean="0">
+            <a:endParaRPr lang="en-US" dirty="0" smtClean="0"/>
+          </a:p>
+          <a:p>
+            <a:r>
+              <a:rPr lang="en-US" dirty="0" smtClean="0">
                 <a:hlinkClick r:id="rId6"/>
               </a:rPr>
-              <a:t>http</a:t>
+              <a:t>https</a:t>
             </a:r>
             <a:r>
               <a:rPr lang="en-US" dirty="0">
                 <a:hlinkClick r:id="rId6"/>
               </a:rPr>
-              <a:t>://cssgridgarden.com</a:t>
+              <a:t>://css-tricks.com/snippets/css/complete-guide-grid</a:t>
             </a:r>
             <a:r>
               <a:rPr lang="en-US" dirty="0" smtClean="0">
@@ -4311,14 +4315,35 @@
           </a:p>
           <a:p>
             <a:r>
+              <a:rPr lang="en-US" dirty="0" smtClean="0">
+                <a:hlinkClick r:id="rId7"/>
+              </a:rPr>
+              <a:t>http</a:t>
+            </a:r>
+            <a:r>
               <a:rPr lang="en-US" dirty="0">
                 <a:hlinkClick r:id="rId7"/>
               </a:rPr>
-              <a:t>https://</a:t>
+              <a:t>://cssgridgarden.com</a:t>
             </a:r>
             <a:r>
               <a:rPr lang="en-US" dirty="0" smtClean="0">
                 <a:hlinkClick r:id="rId7"/>
+              </a:rPr>
+              <a:t>/</a:t>
+            </a:r>
+            <a:endParaRPr lang="en-US" dirty="0" smtClean="0"/>
+          </a:p>
+          <a:p>
+            <a:r>
+              <a:rPr lang="en-US" dirty="0">
+                <a:hlinkClick r:id="rId8"/>
+              </a:rPr>
+              <a:t>https://</a:t>
+            </a:r>
+            <a:r>
+              <a:rPr lang="en-US" dirty="0" smtClean="0">
+                <a:hlinkClick r:id="rId8"/>
               </a:rPr>
               <a:t>tutorialzine.com/2017/03/css-grid-vs-flexbox</a:t>
             </a:r>

</xml_diff>

<commit_message>
updated slides and added new example
</commit_message>
<xml_diff>
--- a/Flexbox and Grid.pptx
+++ b/Flexbox and Grid.pptx
@@ -201,7 +201,7 @@
           <a:p>
             <a:fld id="{3D2B48DD-5806-E040-BB46-CF7EF7496337}" type="datetimeFigureOut">
               <a:rPr lang="en-US" smtClean="0"/>
-              <a:t>10/23/17</a:t>
+              <a:t>10/24/2017</a:t>
             </a:fld>
             <a:endParaRPr lang="en-US"/>
           </a:p>
@@ -708,6 +708,241 @@
 </p:notes>
 </file>
 
+<file path=ppt/notesSlides/notesSlide2.xml><?xml version="1.0" encoding="utf-8"?>
+<p:notes xmlns:a="http://schemas.openxmlformats.org/drawingml/2006/main" xmlns:r="http://schemas.openxmlformats.org/officeDocument/2006/relationships" xmlns:p="http://schemas.openxmlformats.org/presentationml/2006/main">
+  <p:cSld>
+    <p:spTree>
+      <p:nvGrpSpPr>
+        <p:cNvPr id="1" name=""/>
+        <p:cNvGrpSpPr/>
+        <p:nvPr/>
+      </p:nvGrpSpPr>
+      <p:grpSpPr>
+        <a:xfrm>
+          <a:off x="0" y="0"/>
+          <a:ext cx="0" cy="0"/>
+          <a:chOff x="0" y="0"/>
+          <a:chExt cx="0" cy="0"/>
+        </a:xfrm>
+      </p:grpSpPr>
+      <p:sp>
+        <p:nvSpPr>
+          <p:cNvPr id="2" name="Slide Image Placeholder 1"/>
+          <p:cNvSpPr>
+            <a:spLocks noGrp="1" noRot="1" noChangeAspect="1"/>
+          </p:cNvSpPr>
+          <p:nvPr>
+            <p:ph type="sldImg"/>
+          </p:nvPr>
+        </p:nvSpPr>
+        <p:spPr/>
+      </p:sp>
+      <p:sp>
+        <p:nvSpPr>
+          <p:cNvPr id="3" name="Notes Placeholder 2"/>
+          <p:cNvSpPr>
+            <a:spLocks noGrp="1"/>
+          </p:cNvSpPr>
+          <p:nvPr>
+            <p:ph type="body" idx="1"/>
+          </p:nvPr>
+        </p:nvSpPr>
+        <p:spPr/>
+        <p:txBody>
+          <a:bodyPr/>
+          <a:lstStyle/>
+          <a:p>
+            <a:r>
+              <a:rPr lang="en-US" dirty="0" smtClean="0"/>
+              <a:t>With Flexbox the content,</a:t>
+            </a:r>
+            <a:r>
+              <a:rPr lang="en-US" baseline="0" dirty="0" smtClean="0"/>
+              <a:t> to some degree, decides the layout. With Grid you are putting your structure first and foremost.</a:t>
+            </a:r>
+            <a:endParaRPr lang="en-US" dirty="0" smtClean="0"/>
+          </a:p>
+          <a:p>
+            <a:r>
+              <a:rPr lang="en-US" dirty="0" smtClean="0"/>
+              <a:t>Similar items – lists of items</a:t>
+            </a:r>
+          </a:p>
+          <a:p>
+            <a:r>
+              <a:rPr lang="en-US" dirty="0" smtClean="0"/>
+              <a:t>Macro elements –</a:t>
+            </a:r>
+            <a:r>
+              <a:rPr lang="en-US" baseline="0" dirty="0" smtClean="0"/>
+              <a:t> header, footer, aside, content</a:t>
+            </a:r>
+            <a:endParaRPr lang="en-US" dirty="0" smtClean="0"/>
+          </a:p>
+          <a:p>
+            <a:endParaRPr lang="en-US" dirty="0" smtClean="0"/>
+          </a:p>
+          <a:p>
+            <a:endParaRPr lang="en-US" dirty="0" smtClean="0"/>
+          </a:p>
+          <a:p>
+            <a:r>
+              <a:rPr lang="en-US" dirty="0" smtClean="0"/>
+              <a:t>GRID</a:t>
+            </a:r>
+            <a:r>
+              <a:rPr lang="en-US" baseline="0" dirty="0" smtClean="0"/>
+              <a:t> – IE 10+11 supports 2011 spec</a:t>
+            </a:r>
+          </a:p>
+          <a:p>
+            <a:endParaRPr lang="en-US" baseline="0" dirty="0" smtClean="0"/>
+          </a:p>
+          <a:p>
+            <a:r>
+              <a:rPr lang="en-US" baseline="0" dirty="0" smtClean="0"/>
+              <a:t>Table-like support but separating content and presentation</a:t>
+            </a:r>
+            <a:endParaRPr lang="en-US" dirty="0"/>
+          </a:p>
+        </p:txBody>
+      </p:sp>
+      <p:sp>
+        <p:nvSpPr>
+          <p:cNvPr id="4" name="Slide Number Placeholder 3"/>
+          <p:cNvSpPr>
+            <a:spLocks noGrp="1"/>
+          </p:cNvSpPr>
+          <p:nvPr>
+            <p:ph type="sldNum" sz="quarter" idx="10"/>
+          </p:nvPr>
+        </p:nvSpPr>
+        <p:spPr/>
+        <p:txBody>
+          <a:bodyPr/>
+          <a:lstStyle/>
+          <a:p>
+            <a:fld id="{C5D4E551-1A58-3747-B1EC-993A1D0912CC}" type="slidenum">
+              <a:rPr lang="en-US" smtClean="0"/>
+              <a:t>4</a:t>
+            </a:fld>
+            <a:endParaRPr lang="en-US"/>
+          </a:p>
+        </p:txBody>
+      </p:sp>
+    </p:spTree>
+    <p:extLst>
+      <p:ext uri="{BB962C8B-B14F-4D97-AF65-F5344CB8AC3E}">
+        <p14:creationId xmlns:p14="http://schemas.microsoft.com/office/powerpoint/2010/main" val="3487503734"/>
+      </p:ext>
+    </p:extLst>
+  </p:cSld>
+  <p:clrMapOvr>
+    <a:masterClrMapping/>
+  </p:clrMapOvr>
+</p:notes>
+</file>
+
+<file path=ppt/notesSlides/notesSlide3.xml><?xml version="1.0" encoding="utf-8"?>
+<p:notes xmlns:a="http://schemas.openxmlformats.org/drawingml/2006/main" xmlns:r="http://schemas.openxmlformats.org/officeDocument/2006/relationships" xmlns:p="http://schemas.openxmlformats.org/presentationml/2006/main">
+  <p:cSld>
+    <p:spTree>
+      <p:nvGrpSpPr>
+        <p:cNvPr id="1" name=""/>
+        <p:cNvGrpSpPr/>
+        <p:nvPr/>
+      </p:nvGrpSpPr>
+      <p:grpSpPr>
+        <a:xfrm>
+          <a:off x="0" y="0"/>
+          <a:ext cx="0" cy="0"/>
+          <a:chOff x="0" y="0"/>
+          <a:chExt cx="0" cy="0"/>
+        </a:xfrm>
+      </p:grpSpPr>
+      <p:sp>
+        <p:nvSpPr>
+          <p:cNvPr id="2" name="Slide Image Placeholder 1"/>
+          <p:cNvSpPr>
+            <a:spLocks noGrp="1" noRot="1" noChangeAspect="1"/>
+          </p:cNvSpPr>
+          <p:nvPr>
+            <p:ph type="sldImg"/>
+          </p:nvPr>
+        </p:nvSpPr>
+        <p:spPr/>
+      </p:sp>
+      <p:sp>
+        <p:nvSpPr>
+          <p:cNvPr id="3" name="Notes Placeholder 2"/>
+          <p:cNvSpPr>
+            <a:spLocks noGrp="1"/>
+          </p:cNvSpPr>
+          <p:nvPr>
+            <p:ph type="body" idx="1"/>
+          </p:nvPr>
+        </p:nvSpPr>
+        <p:spPr/>
+        <p:txBody>
+          <a:bodyPr/>
+          <a:lstStyle/>
+          <a:p>
+            <a:r>
+              <a:rPr lang="en-US" dirty="0" smtClean="0"/>
+              <a:t>Solutions</a:t>
+            </a:r>
+          </a:p>
+          <a:p>
+            <a:r>
+              <a:rPr lang="en-US" dirty="0" smtClean="0"/>
+              <a:t>http://www.agreatdaytocode.com/flexbox-froggy/</a:t>
+            </a:r>
+          </a:p>
+          <a:p>
+            <a:r>
+              <a:rPr lang="en-US" dirty="0" smtClean="0"/>
+              <a:t>https://programmingmentor.com/post/playing-css-grid-garden/</a:t>
+            </a:r>
+            <a:endParaRPr lang="en-US" dirty="0"/>
+          </a:p>
+        </p:txBody>
+      </p:sp>
+      <p:sp>
+        <p:nvSpPr>
+          <p:cNvPr id="4" name="Slide Number Placeholder 3"/>
+          <p:cNvSpPr>
+            <a:spLocks noGrp="1"/>
+          </p:cNvSpPr>
+          <p:nvPr>
+            <p:ph type="sldNum" sz="quarter" idx="10"/>
+          </p:nvPr>
+        </p:nvSpPr>
+        <p:spPr/>
+        <p:txBody>
+          <a:bodyPr/>
+          <a:lstStyle/>
+          <a:p>
+            <a:fld id="{C5D4E551-1A58-3747-B1EC-993A1D0912CC}" type="slidenum">
+              <a:rPr lang="en-US" smtClean="0"/>
+              <a:t>5</a:t>
+            </a:fld>
+            <a:endParaRPr lang="en-US"/>
+          </a:p>
+        </p:txBody>
+      </p:sp>
+    </p:spTree>
+    <p:extLst>
+      <p:ext uri="{BB962C8B-B14F-4D97-AF65-F5344CB8AC3E}">
+        <p14:creationId xmlns:p14="http://schemas.microsoft.com/office/powerpoint/2010/main" val="2906870302"/>
+      </p:ext>
+    </p:extLst>
+  </p:cSld>
+  <p:clrMapOvr>
+    <a:masterClrMapping/>
+  </p:clrMapOvr>
+</p:notes>
+</file>
+
 <file path=ppt/slideLayouts/slideLayout1.xml><?xml version="1.0" encoding="utf-8"?>
 <p:sldLayout xmlns:a="http://schemas.openxmlformats.org/drawingml/2006/main" xmlns:r="http://schemas.openxmlformats.org/officeDocument/2006/relationships" xmlns:p="http://schemas.openxmlformats.org/presentationml/2006/main" showMasterSp="0" type="title" preserve="1">
   <p:cSld name="Title Slide">
@@ -878,7 +1113,7 @@
             <a:fld id="{87DE6118-2437-4B30-8E3C-4D2BE6020583}" type="datetimeFigureOut">
               <a:rPr lang="en-US" dirty="0"/>
               <a:pPr/>
-              <a:t>10/23/17</a:t>
+              <a:t>10/24/2017</a:t>
             </a:fld>
             <a:endParaRPr lang="en-US" dirty="0"/>
           </a:p>
@@ -1204,7 +1439,7 @@
           <a:p>
             <a:fld id="{87DE6118-2437-4B30-8E3C-4D2BE6020583}" type="datetimeFigureOut">
               <a:rPr lang="en-US" dirty="0"/>
-              <a:t>10/23/17</a:t>
+              <a:t>10/24/2017</a:t>
             </a:fld>
             <a:endParaRPr lang="en-US" dirty="0"/>
           </a:p>
@@ -1379,7 +1614,7 @@
           <a:p>
             <a:fld id="{87DE6118-2437-4B30-8E3C-4D2BE6020583}" type="datetimeFigureOut">
               <a:rPr lang="en-US" dirty="0"/>
-              <a:t>10/23/17</a:t>
+              <a:t>10/24/2017</a:t>
             </a:fld>
             <a:endParaRPr lang="en-US" dirty="0"/>
           </a:p>
@@ -1544,7 +1779,7 @@
           <a:p>
             <a:fld id="{87DE6118-2437-4B30-8E3C-4D2BE6020583}" type="datetimeFigureOut">
               <a:rPr lang="en-US" dirty="0"/>
-              <a:t>10/23/17</a:t>
+              <a:t>10/24/2017</a:t>
             </a:fld>
             <a:endParaRPr lang="en-US" dirty="0"/>
           </a:p>
@@ -1817,7 +2052,7 @@
             <a:fld id="{87DE6118-2437-4B30-8E3C-4D2BE6020583}" type="datetimeFigureOut">
               <a:rPr lang="en-US" dirty="0"/>
               <a:pPr/>
-              <a:t>10/23/17</a:t>
+              <a:t>10/24/2017</a:t>
             </a:fld>
             <a:endParaRPr lang="en-US" dirty="0"/>
           </a:p>
@@ -2207,7 +2442,7 @@
           <a:p>
             <a:fld id="{87DE6118-2437-4B30-8E3C-4D2BE6020583}" type="datetimeFigureOut">
               <a:rPr lang="en-US" dirty="0"/>
-              <a:t>10/23/17</a:t>
+              <a:t>10/24/2017</a:t>
             </a:fld>
             <a:endParaRPr lang="en-US" dirty="0"/>
           </a:p>
@@ -2679,7 +2914,7 @@
           <a:p>
             <a:fld id="{87DE6118-2437-4B30-8E3C-4D2BE6020583}" type="datetimeFigureOut">
               <a:rPr lang="en-US" dirty="0"/>
-              <a:t>10/23/17</a:t>
+              <a:t>10/24/2017</a:t>
             </a:fld>
             <a:endParaRPr lang="en-US" dirty="0"/>
           </a:p>
@@ -2792,7 +3027,7 @@
           <a:p>
             <a:fld id="{87DE6118-2437-4B30-8E3C-4D2BE6020583}" type="datetimeFigureOut">
               <a:rPr lang="en-US" dirty="0"/>
-              <a:t>10/23/17</a:t>
+              <a:t>10/24/2017</a:t>
             </a:fld>
             <a:endParaRPr lang="en-US" dirty="0"/>
           </a:p>
@@ -2882,7 +3117,7 @@
           <a:p>
             <a:fld id="{87DE6118-2437-4B30-8E3C-4D2BE6020583}" type="datetimeFigureOut">
               <a:rPr lang="en-US" dirty="0"/>
-              <a:t>10/23/17</a:t>
+              <a:t>10/24/2017</a:t>
             </a:fld>
             <a:endParaRPr lang="en-US" dirty="0"/>
           </a:p>
@@ -3224,7 +3459,7 @@
             <a:fld id="{87DE6118-2437-4B30-8E3C-4D2BE6020583}" type="datetimeFigureOut">
               <a:rPr lang="en-US" dirty="0"/>
               <a:pPr/>
-              <a:t>10/23/17</a:t>
+              <a:t>10/24/2017</a:t>
             </a:fld>
             <a:endParaRPr lang="en-US" dirty="0"/>
           </a:p>
@@ -3609,7 +3844,7 @@
             <a:fld id="{87DE6118-2437-4B30-8E3C-4D2BE6020583}" type="datetimeFigureOut">
               <a:rPr lang="en-US" dirty="0"/>
               <a:pPr/>
-              <a:t>10/23/17</a:t>
+              <a:t>10/24/2017</a:t>
             </a:fld>
             <a:endParaRPr lang="en-US" dirty="0"/>
           </a:p>
@@ -3884,7 +4119,7 @@
             <a:fld id="{87DE6118-2437-4B30-8E3C-4D2BE6020583}" type="datetimeFigureOut">
               <a:rPr lang="en-US" dirty="0"/>
               <a:pPr/>
-              <a:t>10/23/17</a:t>
+              <a:t>10/24/2017</a:t>
             </a:fld>
             <a:endParaRPr lang="en-US" dirty="0"/>
           </a:p>
@@ -4516,11 +4751,7 @@
           <a:p>
             <a:r>
               <a:rPr lang="en-US" dirty="0" smtClean="0"/>
-              <a:t>Strongly </a:t>
-            </a:r>
-            <a:r>
-              <a:rPr lang="en-US" dirty="0" smtClean="0"/>
-              <a:t>supported</a:t>
+              <a:t>Strongly supported</a:t>
             </a:r>
           </a:p>
           <a:p>
@@ -4615,11 +4846,7 @@
           <a:p>
             <a:r>
               <a:rPr lang="en-US" dirty="0" smtClean="0"/>
-              <a:t>Think tables but with </a:t>
-            </a:r>
-            <a:r>
-              <a:rPr lang="en-US" dirty="0" smtClean="0"/>
-              <a:t>CSS</a:t>
+              <a:t>Think tables but with CSS</a:t>
             </a:r>
           </a:p>
           <a:p>
@@ -4745,17 +4972,51 @@
           <a:p>
             <a:r>
               <a:rPr lang="en-US" dirty="0" smtClean="0"/>
-              <a:t>1 dimensional </a:t>
-            </a:r>
+              <a:t>Works from content out</a:t>
+            </a:r>
+          </a:p>
+          <a:p>
             <a:r>
               <a:rPr lang="en-US" dirty="0" smtClean="0"/>
-              <a:t>layouts</a:t>
+              <a:t>Well suited for similar items</a:t>
             </a:r>
           </a:p>
           <a:p>
             <a:r>
               <a:rPr lang="en-US" dirty="0" smtClean="0"/>
-              <a:t>Better support with older browsers</a:t>
+              <a:t>1 </a:t>
+            </a:r>
+            <a:r>
+              <a:rPr lang="en-US" dirty="0" smtClean="0"/>
+              <a:t>dimensional layouts</a:t>
+            </a:r>
+          </a:p>
+          <a:p>
+            <a:r>
+              <a:rPr lang="en-US" dirty="0" smtClean="0"/>
+              <a:t>Better </a:t>
+            </a:r>
+            <a:r>
+              <a:rPr lang="en-US" dirty="0" smtClean="0"/>
+              <a:t>support </a:t>
+            </a:r>
+            <a:r>
+              <a:rPr lang="en-US" dirty="0" smtClean="0"/>
+              <a:t>with older </a:t>
+            </a:r>
+            <a:r>
+              <a:rPr lang="en-US" dirty="0" smtClean="0"/>
+              <a:t>browsers</a:t>
+            </a:r>
+          </a:p>
+          <a:p>
+            <a:r>
+              <a:rPr lang="en-US" dirty="0"/>
+              <a:t>Allows wrapping, alignment, </a:t>
+            </a:r>
+            <a:r>
+              <a:rPr lang="en-US" dirty="0" smtClean="0"/>
+              <a:t>justify</a:t>
             </a:r>
             <a:endParaRPr lang="en-US" dirty="0"/>
           </a:p>
@@ -4801,18 +5062,43 @@
           <a:p>
             <a:r>
               <a:rPr lang="en-US" dirty="0" smtClean="0"/>
-              <a:t>2 dimensional </a:t>
-            </a:r>
+              <a:t>Works from layout in</a:t>
+            </a:r>
+          </a:p>
+          <a:p>
             <a:r>
               <a:rPr lang="en-US" dirty="0" smtClean="0"/>
-              <a:t>layouts</a:t>
-            </a:r>
+              <a:t>Great for macro elements/regions</a:t>
+            </a:r>
+            <a:endParaRPr lang="en-US" dirty="0" smtClean="0"/>
           </a:p>
           <a:p>
             <a:r>
               <a:rPr lang="en-US" dirty="0" smtClean="0"/>
-              <a:t>Full support just this year</a:t>
-            </a:r>
+              <a:t>2 </a:t>
+            </a:r>
+            <a:r>
+              <a:rPr lang="en-US" dirty="0" smtClean="0"/>
+              <a:t>dimensional layouts</a:t>
+            </a:r>
+          </a:p>
+          <a:p>
+            <a:r>
+              <a:rPr lang="en-US" dirty="0" smtClean="0"/>
+              <a:t>Full support just this </a:t>
+            </a:r>
+            <a:r>
+              <a:rPr lang="en-US" dirty="0" smtClean="0"/>
+              <a:t>year</a:t>
+            </a:r>
+          </a:p>
+          <a:p>
+            <a:r>
+              <a:rPr lang="en-US" dirty="0"/>
+              <a:t>Allows table-like support</a:t>
+            </a:r>
+          </a:p>
+          <a:p>
             <a:endParaRPr lang="en-US" dirty="0"/>
           </a:p>
         </p:txBody>
@@ -4882,120 +5168,97 @@
         </p:nvSpPr>
         <p:spPr/>
         <p:txBody>
-          <a:bodyPr/>
+          <a:bodyPr>
+            <a:normAutofit/>
+          </a:bodyPr>
           <a:lstStyle/>
-          <a:p>
-            <a:r>
-              <a:rPr lang="en-US" dirty="0">
-                <a:hlinkClick r:id="rId2"/>
-              </a:rPr>
-              <a:t>https://</a:t>
-            </a:r>
-            <a:r>
-              <a:rPr lang="en-US" dirty="0" smtClean="0">
-                <a:hlinkClick r:id="rId2"/>
-              </a:rPr>
-              <a:t>github.com/shellwe/Flexbox_Grid</a:t>
-            </a:r>
-            <a:endParaRPr lang="en-US" dirty="0" smtClean="0"/>
-          </a:p>
           <a:p>
             <a:r>
               <a:rPr lang="en-US" dirty="0">
                 <a:hlinkClick r:id="rId3"/>
               </a:rPr>
-              <a:t>https://css-tricks.com/snippets/css/a-guide-to-flexbox</a:t>
-            </a:r>
-            <a:r>
-              <a:rPr lang="en-US" dirty="0" smtClean="0">
-                <a:hlinkClick r:id="rId3"/>
-              </a:rPr>
-              <a:t>/</a:t>
-            </a:r>
-            <a:endParaRPr lang="en-US" dirty="0" smtClean="0"/>
+              <a:t>https://github.com/shellwe/Flexbox_Grid</a:t>
+            </a:r>
+            <a:endParaRPr lang="en-US" dirty="0"/>
           </a:p>
           <a:p>
             <a:r>
               <a:rPr lang="en-US" dirty="0">
                 <a:hlinkClick r:id="rId4"/>
               </a:rPr>
-              <a:t>http://flexboxfroggy.com</a:t>
-            </a:r>
-            <a:r>
-              <a:rPr lang="en-US" dirty="0" smtClean="0">
-                <a:hlinkClick r:id="rId4"/>
-              </a:rPr>
-              <a:t>/</a:t>
-            </a:r>
-            <a:endParaRPr lang="en-US" dirty="0" smtClean="0"/>
+              <a:t>https://css-tricks.com/snippets/css/a-guide-to-flexbox/</a:t>
+            </a:r>
+            <a:endParaRPr lang="en-US" dirty="0"/>
           </a:p>
           <a:p>
             <a:r>
               <a:rPr lang="en-US" dirty="0">
                 <a:hlinkClick r:id="rId5"/>
               </a:rPr>
-              <a:t>https://gridbyexample.com</a:t>
+              <a:t>https://</a:t>
             </a:r>
             <a:r>
               <a:rPr lang="en-US" dirty="0" smtClean="0">
                 <a:hlinkClick r:id="rId5"/>
               </a:rPr>
-              <a:t>/</a:t>
-            </a:r>
-            <a:endParaRPr lang="en-US" dirty="0" smtClean="0"/>
+              <a:t>codepen.io/osublake/full/dMLQJr</a:t>
+            </a:r>
+            <a:endParaRPr lang="en-US" dirty="0" smtClean="0">
+              <a:hlinkClick r:id="rId6"/>
+            </a:endParaRPr>
           </a:p>
           <a:p>
             <a:r>
               <a:rPr lang="en-US" dirty="0" smtClean="0">
                 <a:hlinkClick r:id="rId6"/>
               </a:rPr>
-              <a:t>https</a:t>
+              <a:t>http</a:t>
             </a:r>
             <a:r>
               <a:rPr lang="en-US" dirty="0">
                 <a:hlinkClick r:id="rId6"/>
               </a:rPr>
-              <a:t>://css-tricks.com/snippets/css/complete-guide-grid</a:t>
-            </a:r>
-            <a:r>
-              <a:rPr lang="en-US" dirty="0" smtClean="0">
-                <a:hlinkClick r:id="rId6"/>
-              </a:rPr>
-              <a:t>/</a:t>
-            </a:r>
-            <a:endParaRPr lang="en-US" dirty="0" smtClean="0"/>
-          </a:p>
-          <a:p>
-            <a:r>
-              <a:rPr lang="en-US" dirty="0" smtClean="0">
-                <a:hlinkClick r:id="rId7"/>
-              </a:rPr>
-              <a:t>http</a:t>
-            </a:r>
+              <a:t>://flexboxfroggy.com/</a:t>
+            </a:r>
+            <a:endParaRPr lang="en-US" dirty="0"/>
+          </a:p>
+          <a:p>
             <a:r>
               <a:rPr lang="en-US" dirty="0">
                 <a:hlinkClick r:id="rId7"/>
               </a:rPr>
-              <a:t>://cssgridgarden.com</a:t>
-            </a:r>
-            <a:r>
-              <a:rPr lang="en-US" dirty="0" smtClean="0">
-                <a:hlinkClick r:id="rId7"/>
-              </a:rPr>
-              <a:t>/</a:t>
-            </a:r>
-            <a:endParaRPr lang="en-US" dirty="0" smtClean="0"/>
+              <a:t>https://gridbyexample.com/</a:t>
+            </a:r>
+            <a:endParaRPr lang="en-US" dirty="0"/>
           </a:p>
           <a:p>
             <a:r>
               <a:rPr lang="en-US" dirty="0">
                 <a:hlinkClick r:id="rId8"/>
               </a:rPr>
+              <a:t>https://css-tricks.com/snippets/css/complete-guide-grid/</a:t>
+            </a:r>
+            <a:endParaRPr lang="en-US" dirty="0"/>
+          </a:p>
+          <a:p>
+            <a:r>
+              <a:rPr lang="en-US" dirty="0">
+                <a:hlinkClick r:id="rId9"/>
+              </a:rPr>
+              <a:t>http://cssgridgarden.com/</a:t>
+            </a:r>
+            <a:endParaRPr lang="en-US" dirty="0"/>
+          </a:p>
+          <a:p>
+            <a:r>
+              <a:rPr lang="en-US" dirty="0">
+                <a:hlinkClick r:id="rId10"/>
+              </a:rPr>
               <a:t>https://</a:t>
             </a:r>
             <a:r>
               <a:rPr lang="en-US" dirty="0" smtClean="0">
-                <a:hlinkClick r:id="rId8"/>
+                <a:hlinkClick r:id="rId10"/>
               </a:rPr>
               <a:t>tutorialzine.com/2017/03/css-grid-vs-flexbox</a:t>
             </a:r>

</xml_diff>

<commit_message>
working on flex part of presentation
</commit_message>
<xml_diff>
--- a/Flexbox and Grid.pptx
+++ b/Flexbox and Grid.pptx
@@ -5,14 +5,13 @@
     <p:sldMasterId id="2147483648" r:id="rId1"/>
   </p:sldMasterIdLst>
   <p:notesMasterIdLst>
-    <p:notesMasterId r:id="rId7"/>
+    <p:notesMasterId r:id="rId6"/>
   </p:notesMasterIdLst>
   <p:sldIdLst>
     <p:sldId id="256" r:id="rId2"/>
-    <p:sldId id="257" r:id="rId3"/>
-    <p:sldId id="258" r:id="rId4"/>
-    <p:sldId id="259" r:id="rId5"/>
-    <p:sldId id="260" r:id="rId6"/>
+    <p:sldId id="261" r:id="rId3"/>
+    <p:sldId id="259" r:id="rId4"/>
+    <p:sldId id="260" r:id="rId5"/>
   </p:sldIdLst>
   <p:sldSz cx="12192000" cy="6858000"/>
   <p:notesSz cx="6858000" cy="9144000"/>
@@ -514,161 +513,78 @@
           <a:lstStyle/>
           <a:p>
             <a:r>
-              <a:rPr lang="en-US" sz="1200" b="0" i="0" kern="1200" dirty="0" smtClean="0">
-                <a:solidFill>
-                  <a:schemeClr val="tx1"/>
-                </a:solidFill>
-                <a:effectLst/>
-                <a:latin typeface="+mn-lt"/>
-                <a:ea typeface="+mn-ea"/>
-                <a:cs typeface="+mn-cs"/>
-              </a:rPr>
-              <a:t>CSS Grid Layout (aka "Grid"), is a two-dimensional grid-based layout system that aims to do nothing less than completely change the way we design grid-based user interfaces. CSS has always been used to lay out our web pages, but it's never done a very good job of it. First we used tables, then floats, positioning and inline-block, but all of these methods were essentially hacks and left out a lot of important functionality (vertical centering, for instance). Flexbox helped out, but it's intended for simpler one-dimensional layouts, not complex two-dimensional ones (Flexbox and Grid actually work very well together). Grid is the very first CSS module created specifically to solve the layout problems we've all been hacking our way around for as long as we've been making websites.</a:t>
-            </a:r>
-          </a:p>
-          <a:p>
-            <a:r>
-              <a:rPr lang="en-US" sz="1200" b="1" i="0" kern="1200" dirty="0" smtClean="0">
-                <a:solidFill>
-                  <a:schemeClr val="tx1"/>
-                </a:solidFill>
-                <a:effectLst/>
-                <a:latin typeface="+mn-lt"/>
-                <a:ea typeface="+mn-ea"/>
-                <a:cs typeface="+mn-cs"/>
-              </a:rPr>
-              <a:t>grid</a:t>
-            </a:r>
-            <a:r>
-              <a:rPr lang="en-US" sz="1200" b="0" i="0" kern="1200" dirty="0" smtClean="0">
-                <a:solidFill>
-                  <a:schemeClr val="tx1"/>
-                </a:solidFill>
-                <a:effectLst/>
-                <a:latin typeface="+mn-lt"/>
-                <a:ea typeface="+mn-ea"/>
-                <a:cs typeface="+mn-cs"/>
-              </a:rPr>
-              <a:t> - generates a block-level grid</a:t>
-            </a:r>
-          </a:p>
-          <a:p>
-            <a:r>
-              <a:rPr lang="en-US" sz="1200" b="1" i="0" kern="1200" dirty="0" smtClean="0">
-                <a:solidFill>
-                  <a:schemeClr val="tx1"/>
-                </a:solidFill>
-                <a:effectLst/>
-                <a:latin typeface="+mn-lt"/>
-                <a:ea typeface="+mn-ea"/>
-                <a:cs typeface="+mn-cs"/>
-              </a:rPr>
-              <a:t>inline-grid</a:t>
-            </a:r>
-            <a:r>
-              <a:rPr lang="en-US" sz="1200" b="0" i="0" kern="1200" dirty="0" smtClean="0">
-                <a:solidFill>
-                  <a:schemeClr val="tx1"/>
-                </a:solidFill>
-                <a:effectLst/>
-                <a:latin typeface="+mn-lt"/>
-                <a:ea typeface="+mn-ea"/>
-                <a:cs typeface="+mn-cs"/>
-              </a:rPr>
-              <a:t> - generates an inline-level grid</a:t>
-            </a:r>
-          </a:p>
-          <a:p>
-            <a:r>
-              <a:rPr lang="en-US" sz="1200" b="1" i="0" kern="1200" dirty="0" err="1" smtClean="0">
-                <a:solidFill>
-                  <a:schemeClr val="tx1"/>
-                </a:solidFill>
-                <a:effectLst/>
-                <a:latin typeface="+mn-lt"/>
-                <a:ea typeface="+mn-ea"/>
-                <a:cs typeface="+mn-cs"/>
-              </a:rPr>
-              <a:t>subgrid</a:t>
-            </a:r>
-            <a:r>
-              <a:rPr lang="en-US" sz="1200" b="0" i="0" kern="1200" dirty="0" smtClean="0">
-                <a:solidFill>
-                  <a:schemeClr val="tx1"/>
-                </a:solidFill>
-                <a:effectLst/>
-                <a:latin typeface="+mn-lt"/>
-                <a:ea typeface="+mn-ea"/>
-                <a:cs typeface="+mn-cs"/>
-              </a:rPr>
-              <a:t> - if your grid container is itself a grid item (i.e. nested grids), you can use this property to indicate that you want the sizes of its rows/columns to be taken from its parent rather than specifying its own.</a:t>
-            </a:r>
-          </a:p>
-          <a:p>
-            <a:r>
-              <a:rPr lang="en-US" sz="1200" b="0" i="0" kern="1200" dirty="0" smtClean="0">
-                <a:solidFill>
-                  <a:schemeClr val="tx1"/>
-                </a:solidFill>
-                <a:effectLst/>
-                <a:latin typeface="+mn-lt"/>
-                <a:ea typeface="+mn-ea"/>
-                <a:cs typeface="+mn-cs"/>
-              </a:rPr>
-              <a:t>Note: column, float, clear, and vertical-align have no effect on a grid container.</a:t>
-            </a:r>
-          </a:p>
-          <a:p>
-            <a:r>
-              <a:rPr lang="en-US" sz="1200" b="0" i="0" kern="1200" smtClean="0">
-                <a:solidFill>
-                  <a:schemeClr val="tx1"/>
-                </a:solidFill>
-                <a:effectLst/>
-                <a:latin typeface="+mn-lt"/>
-                <a:ea typeface="+mn-ea"/>
-                <a:cs typeface="+mn-cs"/>
-              </a:rPr>
-              <a:t/>
-            </a:r>
-            <a:br>
-              <a:rPr lang="en-US" sz="1200" b="0" i="0" kern="1200" smtClean="0">
-                <a:solidFill>
-                  <a:schemeClr val="tx1"/>
-                </a:solidFill>
-                <a:effectLst/>
-                <a:latin typeface="+mn-lt"/>
-                <a:ea typeface="+mn-ea"/>
-                <a:cs typeface="+mn-cs"/>
-              </a:rPr>
-            </a:br>
-            <a:endParaRPr lang="en-US" sz="1200" b="0" i="0" kern="1200" smtClean="0">
-              <a:solidFill>
-                <a:schemeClr val="tx1"/>
-              </a:solidFill>
-              <a:effectLst/>
-              <a:latin typeface="+mn-lt"/>
-              <a:ea typeface="+mn-ea"/>
-              <a:cs typeface="+mn-cs"/>
-            </a:endParaRPr>
-          </a:p>
-          <a:p>
-            <a:r>
-              <a:rPr lang="en-US" smtClean="0"/>
-              <a:t/>
-            </a:r>
-            <a:br>
-              <a:rPr lang="en-US" smtClean="0"/>
-            </a:br>
-            <a:endParaRPr lang="en-US" sz="1200" b="0" i="0" kern="1200" dirty="0" smtClean="0">
-              <a:solidFill>
-                <a:schemeClr val="tx1"/>
-              </a:solidFill>
-              <a:effectLst/>
-              <a:latin typeface="+mn-lt"/>
-              <a:ea typeface="+mn-ea"/>
-              <a:cs typeface="+mn-cs"/>
-            </a:endParaRPr>
+              <a:rPr lang="en-US" dirty="0" smtClean="0"/>
+              <a:t>Before the 90’s –</a:t>
+            </a:r>
+            <a:r>
+              <a:rPr lang="en-US" baseline="0" dirty="0" smtClean="0"/>
+              <a:t> Just had a terminal</a:t>
+            </a:r>
+          </a:p>
+          <a:p>
+            <a:r>
+              <a:rPr lang="en-US" baseline="0" dirty="0" smtClean="0"/>
+              <a:t>Stacked Content – 1992 - layout looked pretty close to source, some images here and there inline or in its own space.</a:t>
+            </a:r>
+          </a:p>
+          <a:p>
+            <a:r>
+              <a:rPr lang="en-US" dirty="0" smtClean="0"/>
+              <a:t>Tables –</a:t>
+            </a:r>
+            <a:r>
+              <a:rPr lang="en-US" baseline="0" dirty="0" smtClean="0"/>
+              <a:t> 1995 – layouts became possible, spacing was allowed (with what could fit into 640x480) and bolder colors, images were more prominent</a:t>
+            </a:r>
+          </a:p>
+          <a:p>
+            <a:r>
+              <a:rPr lang="en-US" dirty="0" smtClean="0"/>
+              <a:t>Flash – 1996</a:t>
+            </a:r>
+            <a:r>
+              <a:rPr lang="en-US" baseline="0" dirty="0" smtClean="0"/>
+              <a:t> – Flash came along and when it comes to design it was absolutely amazing. You had a great deal more freedom than what was allowed with HTML up to that point. No SEO</a:t>
+            </a:r>
+          </a:p>
+          <a:p>
+            <a:r>
+              <a:rPr lang="en-US" baseline="0" dirty="0" smtClean="0"/>
+              <a:t>CSS – 2000’s – CSS was our first opportunity to isolate our content from our styling and gave us a great deal more power in how we wanted our styling to look.</a:t>
+            </a:r>
+          </a:p>
+          <a:p>
+            <a:r>
+              <a:rPr lang="en-US" baseline="0" dirty="0" smtClean="0"/>
+              <a:t>As CSS matured we got floats, and positioning and display types and a great deal more power with our structure.</a:t>
+            </a:r>
+          </a:p>
+          <a:p>
+            <a:r>
+              <a:rPr lang="en-US" baseline="0" dirty="0" smtClean="0"/>
+              <a:t>Flexbox – Flexbox actually came out in 2006 by Firefox, it took 9 years to fully mature in 2015.</a:t>
+            </a:r>
+          </a:p>
+          <a:p>
+            <a:r>
+              <a:rPr lang="en-US" baseline="0" dirty="0" smtClean="0"/>
+              <a:t>Frameworks – Since 2010 Frameworks such as Twitter Bootstrap and </a:t>
+            </a:r>
+            <a:r>
+              <a:rPr lang="en-US" baseline="0" dirty="0" err="1" smtClean="0"/>
+              <a:t>Zurb</a:t>
+            </a:r>
+            <a:r>
+              <a:rPr lang="en-US" baseline="0" dirty="0" smtClean="0"/>
+              <a:t> Foundation were very prominent with bootstrap being over 15 percent of the internet https://trends.builtwith.com/docinfo/Twitter-Bootstrap</a:t>
+            </a:r>
+          </a:p>
+          <a:p>
+            <a:r>
+              <a:rPr lang="en-US" baseline="0" dirty="0" smtClean="0"/>
+              <a:t>Responsive – Using media queries responsive has become a standard with around half of the web traffic coming from mobile devices, it is important that various viewports are under consideration when making a site.</a:t>
+            </a:r>
+            <a:endParaRPr lang="en-US" dirty="0"/>
           </a:p>
         </p:txBody>
       </p:sp>
@@ -689,7 +605,7 @@
           <a:p>
             <a:fld id="{C5D4E551-1A58-3747-B1EC-993A1D0912CC}" type="slidenum">
               <a:rPr lang="en-US" smtClean="0"/>
-              <a:t>3</a:t>
+              <a:t>2</a:t>
             </a:fld>
             <a:endParaRPr lang="en-US"/>
           </a:p>
@@ -698,7 +614,7 @@
     </p:spTree>
     <p:extLst>
       <p:ext uri="{BB962C8B-B14F-4D97-AF65-F5344CB8AC3E}">
-        <p14:creationId xmlns:p14="http://schemas.microsoft.com/office/powerpoint/2010/main" val="792637882"/>
+        <p14:creationId xmlns:p14="http://schemas.microsoft.com/office/powerpoint/2010/main" val="4148359239"/>
       </p:ext>
     </p:extLst>
   </p:cSld>
@@ -824,7 +740,7 @@
           <a:p>
             <a:fld id="{C5D4E551-1A58-3747-B1EC-993A1D0912CC}" type="slidenum">
               <a:rPr lang="en-US" smtClean="0"/>
-              <a:t>4</a:t>
+              <a:t>3</a:t>
             </a:fld>
             <a:endParaRPr lang="en-US"/>
           </a:p>
@@ -924,7 +840,7 @@
           <a:p>
             <a:fld id="{C5D4E551-1A58-3747-B1EC-993A1D0912CC}" type="slidenum">
               <a:rPr lang="en-US" smtClean="0"/>
-              <a:t>5</a:t>
+              <a:t>4</a:t>
             </a:fld>
             <a:endParaRPr lang="en-US"/>
           </a:p>
@@ -4728,42 +4644,86 @@
           <a:p>
             <a:r>
               <a:rPr lang="en-US" dirty="0" smtClean="0"/>
+              <a:t>A brief history of layouts</a:t>
+            </a:r>
+            <a:endParaRPr lang="en-US" dirty="0"/>
+          </a:p>
+        </p:txBody>
+      </p:sp>
+      <p:sp>
+        <p:nvSpPr>
+          <p:cNvPr id="3" name="Content Placeholder 2"/>
+          <p:cNvSpPr>
+            <a:spLocks noGrp="1"/>
+          </p:cNvSpPr>
+          <p:nvPr>
+            <p:ph idx="1"/>
+          </p:nvPr>
+        </p:nvSpPr>
+        <p:spPr>
+          <a:xfrm>
+            <a:off x="1371600" y="2285999"/>
+            <a:ext cx="9601200" cy="4426773"/>
+          </a:xfrm>
+        </p:spPr>
+        <p:txBody>
+          <a:bodyPr>
+            <a:normAutofit/>
+          </a:bodyPr>
+          <a:lstStyle/>
+          <a:p>
+            <a:r>
+              <a:rPr lang="en-US" dirty="0" smtClean="0"/>
+              <a:t>Plain text</a:t>
+            </a:r>
+          </a:p>
+          <a:p>
+            <a:r>
+              <a:rPr lang="en-US" dirty="0" smtClean="0"/>
+              <a:t>Stacked content</a:t>
+            </a:r>
+          </a:p>
+          <a:p>
+            <a:r>
+              <a:rPr lang="en-US" dirty="0" smtClean="0"/>
+              <a:t>Tables</a:t>
+            </a:r>
+          </a:p>
+          <a:p>
+            <a:r>
+              <a:rPr lang="en-US" dirty="0" smtClean="0"/>
+              <a:t>Flash</a:t>
+            </a:r>
+          </a:p>
+          <a:p>
+            <a:r>
+              <a:rPr lang="en-US" dirty="0" smtClean="0"/>
+              <a:t>CSS</a:t>
+            </a:r>
+          </a:p>
+          <a:p>
+            <a:r>
+              <a:rPr lang="en-US" dirty="0" smtClean="0"/>
               <a:t>Flexbox</a:t>
             </a:r>
-            <a:endParaRPr lang="en-US" dirty="0"/>
-          </a:p>
-        </p:txBody>
-      </p:sp>
-      <p:sp>
-        <p:nvSpPr>
-          <p:cNvPr id="3" name="Content Placeholder 2"/>
-          <p:cNvSpPr>
-            <a:spLocks noGrp="1"/>
-          </p:cNvSpPr>
-          <p:nvPr>
-            <p:ph idx="1"/>
-          </p:nvPr>
-        </p:nvSpPr>
-        <p:spPr/>
-        <p:txBody>
-          <a:bodyPr/>
-          <a:lstStyle/>
+          </a:p>
           <a:p>
             <a:r>
               <a:rPr lang="en-US" dirty="0" smtClean="0"/>
-              <a:t>Strongly supported</a:t>
+              <a:t>Frameworks</a:t>
             </a:r>
           </a:p>
           <a:p>
             <a:r>
               <a:rPr lang="en-US" dirty="0" smtClean="0"/>
-              <a:t>Most searched item on </a:t>
-            </a:r>
-            <a:r>
-              <a:rPr lang="en-US" dirty="0" err="1" smtClean="0"/>
-              <a:t>caniuse.com</a:t>
-            </a:r>
-            <a:endParaRPr lang="en-US" dirty="0" smtClean="0"/>
+              <a:t>Responsive</a:t>
+            </a:r>
+          </a:p>
+          <a:p>
+            <a:r>
+              <a:rPr lang="en-US" dirty="0" smtClean="0"/>
+              <a:t>CSS Grids</a:t>
+            </a:r>
           </a:p>
           <a:p>
             <a:endParaRPr lang="en-US" dirty="0"/>
@@ -4773,7 +4733,7 @@
     </p:spTree>
     <p:extLst>
       <p:ext uri="{BB962C8B-B14F-4D97-AF65-F5344CB8AC3E}">
-        <p14:creationId xmlns:p14="http://schemas.microsoft.com/office/powerpoint/2010/main" val="197581193"/>
+        <p14:creationId xmlns:p14="http://schemas.microsoft.com/office/powerpoint/2010/main" val="2519615971"/>
       </p:ext>
     </p:extLst>
   </p:cSld>
@@ -4817,6 +4777,132 @@
           <a:p>
             <a:r>
               <a:rPr lang="en-US" dirty="0" smtClean="0"/>
+              <a:t>Flexbox vs CSS Grid</a:t>
+            </a:r>
+            <a:endParaRPr lang="en-US" dirty="0"/>
+          </a:p>
+        </p:txBody>
+      </p:sp>
+      <p:sp>
+        <p:nvSpPr>
+          <p:cNvPr id="6" name="Text Placeholder 5"/>
+          <p:cNvSpPr>
+            <a:spLocks noGrp="1"/>
+          </p:cNvSpPr>
+          <p:nvPr>
+            <p:ph type="body" idx="1"/>
+          </p:nvPr>
+        </p:nvSpPr>
+        <p:spPr/>
+        <p:txBody>
+          <a:bodyPr/>
+          <a:lstStyle/>
+          <a:p>
+            <a:r>
+              <a:rPr lang="en-US" dirty="0" smtClean="0"/>
+              <a:t>Flexbox</a:t>
+            </a:r>
+            <a:endParaRPr lang="en-US" dirty="0"/>
+          </a:p>
+        </p:txBody>
+      </p:sp>
+      <p:sp>
+        <p:nvSpPr>
+          <p:cNvPr id="7" name="Content Placeholder 6"/>
+          <p:cNvSpPr>
+            <a:spLocks noGrp="1"/>
+          </p:cNvSpPr>
+          <p:nvPr>
+            <p:ph sz="half" idx="2"/>
+          </p:nvPr>
+        </p:nvSpPr>
+        <p:spPr>
+          <a:xfrm>
+            <a:off x="1371600" y="3305207"/>
+            <a:ext cx="4443984" cy="3364534"/>
+          </a:xfrm>
+        </p:spPr>
+        <p:txBody>
+          <a:bodyPr>
+            <a:normAutofit/>
+          </a:bodyPr>
+          <a:lstStyle/>
+          <a:p>
+            <a:r>
+              <a:rPr lang="en-US" dirty="0" smtClean="0"/>
+              <a:t>Works from content out</a:t>
+            </a:r>
+          </a:p>
+          <a:p>
+            <a:r>
+              <a:rPr lang="en-US" dirty="0" smtClean="0"/>
+              <a:t>Well suited for similar items</a:t>
+            </a:r>
+          </a:p>
+          <a:p>
+            <a:r>
+              <a:rPr lang="en-US" dirty="0" smtClean="0"/>
+              <a:t>1 </a:t>
+            </a:r>
+            <a:r>
+              <a:rPr lang="en-US" dirty="0" smtClean="0"/>
+              <a:t>dimensional layouts</a:t>
+            </a:r>
+          </a:p>
+          <a:p>
+            <a:r>
+              <a:rPr lang="en-US" dirty="0" smtClean="0"/>
+              <a:t>Better </a:t>
+            </a:r>
+            <a:r>
+              <a:rPr lang="en-US" dirty="0" smtClean="0"/>
+              <a:t>support </a:t>
+            </a:r>
+            <a:r>
+              <a:rPr lang="en-US" dirty="0" smtClean="0"/>
+              <a:t>with older </a:t>
+            </a:r>
+            <a:r>
+              <a:rPr lang="en-US" dirty="0" smtClean="0"/>
+              <a:t>browsers</a:t>
+            </a:r>
+          </a:p>
+          <a:p>
+            <a:r>
+              <a:rPr lang="en-US" dirty="0"/>
+              <a:t>Allows wrapping, alignment, </a:t>
+            </a:r>
+            <a:r>
+              <a:rPr lang="en-US" dirty="0" smtClean="0"/>
+              <a:t>justify</a:t>
+            </a:r>
+          </a:p>
+          <a:p>
+            <a:r>
+              <a:rPr lang="en-US" dirty="0" smtClean="0"/>
+              <a:t>Most searched on caniuse.com</a:t>
+            </a:r>
+            <a:endParaRPr lang="en-US" dirty="0"/>
+          </a:p>
+        </p:txBody>
+      </p:sp>
+      <p:sp>
+        <p:nvSpPr>
+          <p:cNvPr id="8" name="Text Placeholder 7"/>
+          <p:cNvSpPr>
+            <a:spLocks noGrp="1"/>
+          </p:cNvSpPr>
+          <p:nvPr>
+            <p:ph type="body" sz="quarter" idx="3"/>
+          </p:nvPr>
+        </p:nvSpPr>
+        <p:spPr/>
+        <p:txBody>
+          <a:bodyPr/>
+          <a:lstStyle/>
+          <a:p>
+            <a:r>
+              <a:rPr lang="en-US" dirty="0" smtClean="0"/>
               <a:t>CSS Grid</a:t>
             </a:r>
             <a:endParaRPr lang="en-US" dirty="0"/>
@@ -4825,56 +4911,76 @@
       </p:sp>
       <p:sp>
         <p:nvSpPr>
-          <p:cNvPr id="3" name="Content Placeholder 2"/>
-          <p:cNvSpPr>
-            <a:spLocks noGrp="1"/>
-          </p:cNvSpPr>
-          <p:nvPr>
-            <p:ph idx="1"/>
-          </p:nvPr>
-        </p:nvSpPr>
-        <p:spPr/>
-        <p:txBody>
-          <a:bodyPr/>
+          <p:cNvPr id="9" name="Content Placeholder 8"/>
+          <p:cNvSpPr>
+            <a:spLocks noGrp="1"/>
+          </p:cNvSpPr>
+          <p:nvPr>
+            <p:ph sz="quarter" idx="4"/>
+          </p:nvPr>
+        </p:nvSpPr>
+        <p:spPr>
+          <a:xfrm>
+            <a:off x="6525014" y="3305207"/>
+            <a:ext cx="4443984" cy="3439838"/>
+          </a:xfrm>
+        </p:spPr>
+        <p:txBody>
+          <a:bodyPr>
+            <a:normAutofit/>
+          </a:bodyPr>
           <a:lstStyle/>
           <a:p>
             <a:r>
               <a:rPr lang="en-US" dirty="0" smtClean="0"/>
-              <a:t>First 2 dimensional layout tool</a:t>
+              <a:t>Works from layout in</a:t>
             </a:r>
           </a:p>
           <a:p>
             <a:r>
               <a:rPr lang="en-US" dirty="0" smtClean="0"/>
-              <a:t>Think tables but with CSS</a:t>
-            </a:r>
+              <a:t>Great for macro elements/regions</a:t>
+            </a:r>
+            <a:endParaRPr lang="en-US" dirty="0" smtClean="0"/>
           </a:p>
           <a:p>
             <a:r>
               <a:rPr lang="en-US" dirty="0" smtClean="0"/>
-              <a:t>3 ways to display a CSS Grid</a:t>
-            </a:r>
-          </a:p>
-          <a:p>
-            <a:pPr lvl="1"/>
+              <a:t>2 </a:t>
+            </a:r>
             <a:r>
               <a:rPr lang="en-US" dirty="0" smtClean="0"/>
-              <a:t>Grid</a:t>
-            </a:r>
-          </a:p>
-          <a:p>
-            <a:pPr lvl="1"/>
+              <a:t>dimensional layouts</a:t>
+            </a:r>
+          </a:p>
+          <a:p>
             <a:r>
               <a:rPr lang="en-US" dirty="0" smtClean="0"/>
-              <a:t>inline-grid</a:t>
-            </a:r>
-          </a:p>
-          <a:p>
-            <a:pPr lvl="1"/>
-            <a:r>
-              <a:rPr lang="en-US" dirty="0" err="1" smtClean="0"/>
-              <a:t>subgrid</a:t>
-            </a:r>
+              <a:t>Full support just this </a:t>
+            </a:r>
+            <a:r>
+              <a:rPr lang="en-US" dirty="0" smtClean="0"/>
+              <a:t>year</a:t>
+            </a:r>
+          </a:p>
+          <a:p>
+            <a:r>
+              <a:rPr lang="en-US" dirty="0"/>
+              <a:t>Allows table-like </a:t>
+            </a:r>
+            <a:r>
+              <a:rPr lang="en-US" dirty="0" smtClean="0"/>
+              <a:t>support</a:t>
+            </a:r>
+          </a:p>
+          <a:p>
+            <a:r>
+              <a:rPr lang="en-US" dirty="0" smtClean="0"/>
+              <a:t>Second most searched</a:t>
+            </a:r>
+            <a:endParaRPr lang="en-US" dirty="0"/>
+          </a:p>
+          <a:p>
             <a:endParaRPr lang="en-US" dirty="0"/>
           </a:p>
         </p:txBody>
@@ -4882,7 +4988,7 @@
     </p:spTree>
     <p:extLst>
       <p:ext uri="{BB962C8B-B14F-4D97-AF65-F5344CB8AC3E}">
-        <p14:creationId xmlns:p14="http://schemas.microsoft.com/office/powerpoint/2010/main" val="1383945154"/>
+        <p14:creationId xmlns:p14="http://schemas.microsoft.com/office/powerpoint/2010/main" val="74182352"/>
       </p:ext>
     </p:extLst>
   </p:cSld>
@@ -4911,230 +5017,6 @@
       </p:grpSpPr>
       <p:sp>
         <p:nvSpPr>
-          <p:cNvPr id="2" name="Title 1"/>
-          <p:cNvSpPr>
-            <a:spLocks noGrp="1"/>
-          </p:cNvSpPr>
-          <p:nvPr>
-            <p:ph type="title"/>
-          </p:nvPr>
-        </p:nvSpPr>
-        <p:spPr/>
-        <p:txBody>
-          <a:bodyPr/>
-          <a:lstStyle/>
-          <a:p>
-            <a:r>
-              <a:rPr lang="en-US" dirty="0" smtClean="0"/>
-              <a:t>Flexbox vs CSS Grid</a:t>
-            </a:r>
-            <a:endParaRPr lang="en-US" dirty="0"/>
-          </a:p>
-        </p:txBody>
-      </p:sp>
-      <p:sp>
-        <p:nvSpPr>
-          <p:cNvPr id="6" name="Text Placeholder 5"/>
-          <p:cNvSpPr>
-            <a:spLocks noGrp="1"/>
-          </p:cNvSpPr>
-          <p:nvPr>
-            <p:ph type="body" idx="1"/>
-          </p:nvPr>
-        </p:nvSpPr>
-        <p:spPr/>
-        <p:txBody>
-          <a:bodyPr/>
-          <a:lstStyle/>
-          <a:p>
-            <a:r>
-              <a:rPr lang="en-US" dirty="0" smtClean="0"/>
-              <a:t>Flexbox</a:t>
-            </a:r>
-            <a:endParaRPr lang="en-US" dirty="0"/>
-          </a:p>
-        </p:txBody>
-      </p:sp>
-      <p:sp>
-        <p:nvSpPr>
-          <p:cNvPr id="7" name="Content Placeholder 6"/>
-          <p:cNvSpPr>
-            <a:spLocks noGrp="1"/>
-          </p:cNvSpPr>
-          <p:nvPr>
-            <p:ph sz="half" idx="2"/>
-          </p:nvPr>
-        </p:nvSpPr>
-        <p:spPr/>
-        <p:txBody>
-          <a:bodyPr/>
-          <a:lstStyle/>
-          <a:p>
-            <a:r>
-              <a:rPr lang="en-US" dirty="0" smtClean="0"/>
-              <a:t>Works from content out</a:t>
-            </a:r>
-          </a:p>
-          <a:p>
-            <a:r>
-              <a:rPr lang="en-US" dirty="0" smtClean="0"/>
-              <a:t>Well suited for similar items</a:t>
-            </a:r>
-          </a:p>
-          <a:p>
-            <a:r>
-              <a:rPr lang="en-US" dirty="0" smtClean="0"/>
-              <a:t>1 </a:t>
-            </a:r>
-            <a:r>
-              <a:rPr lang="en-US" dirty="0" smtClean="0"/>
-              <a:t>dimensional layouts</a:t>
-            </a:r>
-          </a:p>
-          <a:p>
-            <a:r>
-              <a:rPr lang="en-US" dirty="0" smtClean="0"/>
-              <a:t>Better </a:t>
-            </a:r>
-            <a:r>
-              <a:rPr lang="en-US" dirty="0" smtClean="0"/>
-              <a:t>support </a:t>
-            </a:r>
-            <a:r>
-              <a:rPr lang="en-US" dirty="0" smtClean="0"/>
-              <a:t>with older </a:t>
-            </a:r>
-            <a:r>
-              <a:rPr lang="en-US" dirty="0" smtClean="0"/>
-              <a:t>browsers</a:t>
-            </a:r>
-          </a:p>
-          <a:p>
-            <a:r>
-              <a:rPr lang="en-US" dirty="0"/>
-              <a:t>Allows wrapping, alignment, </a:t>
-            </a:r>
-            <a:r>
-              <a:rPr lang="en-US" dirty="0" smtClean="0"/>
-              <a:t>justify</a:t>
-            </a:r>
-            <a:endParaRPr lang="en-US" dirty="0"/>
-          </a:p>
-        </p:txBody>
-      </p:sp>
-      <p:sp>
-        <p:nvSpPr>
-          <p:cNvPr id="8" name="Text Placeholder 7"/>
-          <p:cNvSpPr>
-            <a:spLocks noGrp="1"/>
-          </p:cNvSpPr>
-          <p:nvPr>
-            <p:ph type="body" sz="quarter" idx="3"/>
-          </p:nvPr>
-        </p:nvSpPr>
-        <p:spPr/>
-        <p:txBody>
-          <a:bodyPr/>
-          <a:lstStyle/>
-          <a:p>
-            <a:r>
-              <a:rPr lang="en-US" dirty="0" smtClean="0"/>
-              <a:t>CSS Grid</a:t>
-            </a:r>
-            <a:endParaRPr lang="en-US" dirty="0"/>
-          </a:p>
-        </p:txBody>
-      </p:sp>
-      <p:sp>
-        <p:nvSpPr>
-          <p:cNvPr id="9" name="Content Placeholder 8"/>
-          <p:cNvSpPr>
-            <a:spLocks noGrp="1"/>
-          </p:cNvSpPr>
-          <p:nvPr>
-            <p:ph sz="quarter" idx="4"/>
-          </p:nvPr>
-        </p:nvSpPr>
-        <p:spPr/>
-        <p:txBody>
-          <a:bodyPr/>
-          <a:lstStyle/>
-          <a:p>
-            <a:r>
-              <a:rPr lang="en-US" dirty="0" smtClean="0"/>
-              <a:t>Works from layout in</a:t>
-            </a:r>
-          </a:p>
-          <a:p>
-            <a:r>
-              <a:rPr lang="en-US" dirty="0" smtClean="0"/>
-              <a:t>Great for macro elements/regions</a:t>
-            </a:r>
-            <a:endParaRPr lang="en-US" dirty="0" smtClean="0"/>
-          </a:p>
-          <a:p>
-            <a:r>
-              <a:rPr lang="en-US" dirty="0" smtClean="0"/>
-              <a:t>2 </a:t>
-            </a:r>
-            <a:r>
-              <a:rPr lang="en-US" dirty="0" smtClean="0"/>
-              <a:t>dimensional layouts</a:t>
-            </a:r>
-          </a:p>
-          <a:p>
-            <a:r>
-              <a:rPr lang="en-US" dirty="0" smtClean="0"/>
-              <a:t>Full support just this </a:t>
-            </a:r>
-            <a:r>
-              <a:rPr lang="en-US" dirty="0" smtClean="0"/>
-              <a:t>year</a:t>
-            </a:r>
-          </a:p>
-          <a:p>
-            <a:r>
-              <a:rPr lang="en-US" dirty="0"/>
-              <a:t>Allows table-like support</a:t>
-            </a:r>
-          </a:p>
-          <a:p>
-            <a:endParaRPr lang="en-US" dirty="0"/>
-          </a:p>
-        </p:txBody>
-      </p:sp>
-    </p:spTree>
-    <p:extLst>
-      <p:ext uri="{BB962C8B-B14F-4D97-AF65-F5344CB8AC3E}">
-        <p14:creationId xmlns:p14="http://schemas.microsoft.com/office/powerpoint/2010/main" val="74182352"/>
-      </p:ext>
-    </p:extLst>
-  </p:cSld>
-  <p:clrMapOvr>
-    <a:masterClrMapping/>
-  </p:clrMapOvr>
-</p:sld>
-</file>
-
-<file path=ppt/slides/slide5.xml><?xml version="1.0" encoding="utf-8"?>
-<p:sld xmlns:a="http://schemas.openxmlformats.org/drawingml/2006/main" xmlns:r="http://schemas.openxmlformats.org/officeDocument/2006/relationships" xmlns:p="http://schemas.openxmlformats.org/presentationml/2006/main">
-  <p:cSld>
-    <p:spTree>
-      <p:nvGrpSpPr>
-        <p:cNvPr id="1" name=""/>
-        <p:cNvGrpSpPr/>
-        <p:nvPr/>
-      </p:nvGrpSpPr>
-      <p:grpSpPr>
-        <a:xfrm>
-          <a:off x="0" y="0"/>
-          <a:ext cx="0" cy="0"/>
-          <a:chOff x="0" y="0"/>
-          <a:chExt cx="0" cy="0"/>
-        </a:xfrm>
-      </p:grpSpPr>
-      <p:sp>
-        <p:nvSpPr>
           <p:cNvPr id="7" name="Title 6"/>
           <p:cNvSpPr>
             <a:spLocks noGrp="1"/>
@@ -5166,7 +5048,12 @@
             <p:ph idx="1"/>
           </p:nvPr>
         </p:nvSpPr>
-        <p:spPr/>
+        <p:spPr>
+          <a:xfrm>
+            <a:off x="1371600" y="2286000"/>
+            <a:ext cx="9601200" cy="4308438"/>
+          </a:xfrm>
+        </p:spPr>
         <p:txBody>
           <a:bodyPr>
             <a:normAutofit/>
@@ -5262,10 +5149,133 @@
               </a:rPr>
               <a:t>tutorialzine.com/2017/03/css-grid-vs-flexbox</a:t>
             </a:r>
+          </a:p>
+          <a:p>
+            <a:r>
+              <a:rPr lang="en-US" dirty="0">
+                <a:hlinkClick r:id="rId10"/>
+              </a:rPr>
+              <a:t>http://bit.ly/css-grid-nebr-code</a:t>
+            </a:r>
+            <a:endParaRPr lang="en-US" dirty="0" smtClean="0">
+              <a:hlinkClick r:id="rId10"/>
+            </a:endParaRPr>
+          </a:p>
+          <a:p>
             <a:endParaRPr lang="en-US" dirty="0" smtClean="0"/>
           </a:p>
           <a:p>
             <a:endParaRPr lang="en-US" dirty="0"/>
+          </a:p>
+        </p:txBody>
+      </p:sp>
+      <p:sp>
+        <p:nvSpPr>
+          <p:cNvPr id="3" name="Rectangle 1"/>
+          <p:cNvSpPr>
+            <a:spLocks noChangeArrowheads="1"/>
+          </p:cNvSpPr>
+          <p:nvPr/>
+        </p:nvSpPr>
+        <p:spPr bwMode="auto">
+          <a:xfrm>
+            <a:off x="0" y="0"/>
+            <a:ext cx="12192000" cy="0"/>
+          </a:xfrm>
+          <a:prstGeom prst="rect">
+            <a:avLst/>
+          </a:prstGeom>
+          <a:solidFill>
+            <a:srgbClr val="FFFFFF"/>
+          </a:solidFill>
+          <a:ln>
+            <a:noFill/>
+          </a:ln>
+          <a:effectLst/>
+          <a:extLst>
+            <a:ext uri="{91240B29-F687-4F45-9708-019B960494DF}">
+              <a14:hiddenLine xmlns:a14="http://schemas.microsoft.com/office/drawing/2010/main" w="9525">
+                <a:solidFill>
+                  <a:schemeClr val="tx1"/>
+                </a:solidFill>
+                <a:miter lim="800000"/>
+                <a:headEnd/>
+                <a:tailEnd/>
+              </a14:hiddenLine>
+            </a:ext>
+            <a:ext uri="{AF507438-7753-43E0-B8FC-AC1667EBCBE1}">
+              <a14:hiddenEffects xmlns:a14="http://schemas.microsoft.com/office/drawing/2010/main">
+                <a:effectLst>
+                  <a:outerShdw dist="35921" dir="2700000" algn="ctr" rotWithShape="0">
+                    <a:schemeClr val="bg2"/>
+                  </a:outerShdw>
+                </a:effectLst>
+              </a14:hiddenEffects>
+            </a:ext>
+          </a:extLst>
+        </p:spPr>
+        <p:txBody>
+          <a:bodyPr vert="horz" wrap="square" lIns="91440" tIns="45720" rIns="91440" bIns="45720" numCol="1" anchor="ctr" anchorCtr="0" compatLnSpc="1">
+            <a:prstTxWarp prst="textNoShape">
+              <a:avLst/>
+            </a:prstTxWarp>
+            <a:spAutoFit/>
+          </a:bodyPr>
+          <a:lstStyle/>
+          <a:p>
+            <a:pPr marL="0" marR="0" lvl="0" indent="0" algn="l" defTabSz="914400" rtl="0" eaLnBrk="0" fontAlgn="base" latinLnBrk="0" hangingPunct="0">
+              <a:lnSpc>
+                <a:spcPct val="100000"/>
+              </a:lnSpc>
+              <a:spcBef>
+                <a:spcPct val="0"/>
+              </a:spcBef>
+              <a:spcAft>
+                <a:spcPct val="0"/>
+              </a:spcAft>
+              <a:buClrTx/>
+              <a:buSzTx/>
+              <a:buFontTx/>
+              <a:buNone/>
+              <a:tabLst/>
+            </a:pPr>
+            <a:r>
+              <a:rPr kumimoji="0" lang="en-US" altLang="en-US" sz="900" b="0" i="0" u="none" strike="noStrike" cap="none" normalizeH="0" baseline="0" smtClean="0">
+                <a:ln>
+                  <a:noFill/>
+                </a:ln>
+                <a:solidFill>
+                  <a:srgbClr val="222222"/>
+                </a:solidFill>
+                <a:effectLst/>
+                <a:latin typeface="Arial" panose="020B0604020202020204" pitchFamily="34" charset="0"/>
+                <a:cs typeface="Arial" panose="020B0604020202020204" pitchFamily="34" charset="0"/>
+              </a:rPr>
+              <a:t>http://bit.ly/css-grid-nebr-code</a:t>
+            </a:r>
+            <a:br>
+              <a:rPr kumimoji="0" lang="en-US" altLang="en-US" sz="900" b="0" i="0" u="none" strike="noStrike" cap="none" normalizeH="0" baseline="0" smtClean="0">
+                <a:ln>
+                  <a:noFill/>
+                </a:ln>
+                <a:solidFill>
+                  <a:srgbClr val="222222"/>
+                </a:solidFill>
+                <a:effectLst/>
+                <a:latin typeface="Arial" panose="020B0604020202020204" pitchFamily="34" charset="0"/>
+                <a:cs typeface="Arial" panose="020B0604020202020204" pitchFamily="34" charset="0"/>
+              </a:rPr>
+            </a:br>
+            <a:endParaRPr kumimoji="0" lang="en-US" altLang="en-US" sz="1800" b="0" i="0" u="none" strike="noStrike" cap="none" normalizeH="0" baseline="0" smtClean="0">
+              <a:ln>
+                <a:noFill/>
+              </a:ln>
+              <a:solidFill>
+                <a:schemeClr val="tx1"/>
+              </a:solidFill>
+              <a:effectLst/>
+              <a:latin typeface="Arial" panose="020B0604020202020204" pitchFamily="34" charset="0"/>
+            </a:endParaRPr>
           </a:p>
         </p:txBody>
       </p:sp>

</xml_diff>

<commit_message>
added animations and my github link
</commit_message>
<xml_diff>
--- a/Flexbox and Grid.pptx
+++ b/Flexbox and Grid.pptx
@@ -118,6 +118,10 @@
 </p:presentation>
 </file>
 
+<file path=ppt/revisionInfo.xml><?xml version="1.0" encoding="utf-8"?>
+<p1510:revInfo xmlns:a="http://schemas.openxmlformats.org/drawingml/2006/main" xmlns:r="http://schemas.openxmlformats.org/officeDocument/2006/relationships" xmlns:p1510="http://schemas.microsoft.com/office/powerpoint/2015/10/main"/>
+</file>
+
 <file path=ppt/notesMasters/notesMaster1.xml><?xml version="1.0" encoding="utf-8"?>
 <p:notesMaster xmlns:a="http://schemas.openxmlformats.org/drawingml/2006/main" xmlns:r="http://schemas.openxmlformats.org/officeDocument/2006/relationships" xmlns:p="http://schemas.openxmlformats.org/presentationml/2006/main">
   <p:cSld>
@@ -264,38 +268,37 @@
           <a:p>
             <a:pPr lvl="0"/>
             <a:r>
-              <a:rPr lang="en-US" smtClean="0"/>
+              <a:rPr lang="en-US"/>
               <a:t>Click to edit Master text styles</a:t>
             </a:r>
           </a:p>
           <a:p>
             <a:pPr lvl="1"/>
             <a:r>
-              <a:rPr lang="en-US" smtClean="0"/>
+              <a:rPr lang="en-US"/>
               <a:t>Second level</a:t>
             </a:r>
           </a:p>
           <a:p>
             <a:pPr lvl="2"/>
             <a:r>
-              <a:rPr lang="en-US" smtClean="0"/>
+              <a:rPr lang="en-US"/>
               <a:t>Third level</a:t>
             </a:r>
           </a:p>
           <a:p>
             <a:pPr lvl="3"/>
             <a:r>
-              <a:rPr lang="en-US" smtClean="0"/>
+              <a:rPr lang="en-US"/>
               <a:t>Fourth level</a:t>
             </a:r>
           </a:p>
           <a:p>
             <a:pPr lvl="4"/>
             <a:r>
-              <a:rPr lang="en-US" smtClean="0"/>
+              <a:rPr lang="en-US"/>
               <a:t>Fifth level</a:t>
             </a:r>
-            <a:endParaRPr lang="en-US"/>
           </a:p>
         </p:txBody>
       </p:sp>
@@ -513,75 +516,75 @@
           <a:lstStyle/>
           <a:p>
             <a:r>
-              <a:rPr lang="en-US" dirty="0" smtClean="0"/>
+              <a:rPr lang="en-US" dirty="0"/>
               <a:t>Before the 90’s –</a:t>
             </a:r>
             <a:r>
-              <a:rPr lang="en-US" baseline="0" dirty="0" smtClean="0"/>
+              <a:rPr lang="en-US" baseline="0" dirty="0"/>
               <a:t> Just had a terminal</a:t>
             </a:r>
           </a:p>
           <a:p>
             <a:r>
-              <a:rPr lang="en-US" baseline="0" dirty="0" smtClean="0"/>
+              <a:rPr lang="en-US" baseline="0" dirty="0"/>
               <a:t>Stacked Content – 1992 - layout looked pretty close to source, some images here and there inline or in its own space.</a:t>
             </a:r>
           </a:p>
           <a:p>
             <a:r>
-              <a:rPr lang="en-US" dirty="0" smtClean="0"/>
+              <a:rPr lang="en-US" dirty="0"/>
               <a:t>Tables –</a:t>
             </a:r>
             <a:r>
-              <a:rPr lang="en-US" baseline="0" dirty="0" smtClean="0"/>
+              <a:rPr lang="en-US" baseline="0" dirty="0"/>
               <a:t> 1995 – layouts became possible, spacing was allowed (with what could fit into 640x480) and bolder colors, images were more prominent</a:t>
             </a:r>
           </a:p>
           <a:p>
             <a:r>
-              <a:rPr lang="en-US" dirty="0" smtClean="0"/>
+              <a:rPr lang="en-US" dirty="0"/>
               <a:t>Flash – 1996</a:t>
             </a:r>
             <a:r>
-              <a:rPr lang="en-US" baseline="0" dirty="0" smtClean="0"/>
+              <a:rPr lang="en-US" baseline="0" dirty="0"/>
               <a:t> – Flash came along and when it comes to design it was absolutely amazing. You had a great deal more freedom than what was allowed with HTML up to that point. No SEO</a:t>
             </a:r>
           </a:p>
           <a:p>
             <a:r>
-              <a:rPr lang="en-US" baseline="0" dirty="0" smtClean="0"/>
+              <a:rPr lang="en-US" baseline="0" dirty="0"/>
               <a:t>CSS – 2000’s – CSS was our first opportunity to isolate our content from our styling and gave us a great deal more power in how we wanted our styling to look.</a:t>
             </a:r>
           </a:p>
           <a:p>
             <a:r>
-              <a:rPr lang="en-US" baseline="0" dirty="0" smtClean="0"/>
+              <a:rPr lang="en-US" baseline="0" dirty="0"/>
               <a:t>As CSS matured we got floats, and positioning and display types and a great deal more power with our structure.</a:t>
             </a:r>
           </a:p>
           <a:p>
             <a:r>
-              <a:rPr lang="en-US" baseline="0" dirty="0" smtClean="0"/>
+              <a:rPr lang="en-US" baseline="0" dirty="0"/>
               <a:t>Flexbox – Flexbox actually came out in 2006 by Firefox, it took 9 years to fully mature in 2015.</a:t>
             </a:r>
           </a:p>
           <a:p>
             <a:r>
-              <a:rPr lang="en-US" baseline="0" dirty="0" smtClean="0"/>
+              <a:rPr lang="en-US" baseline="0" dirty="0"/>
               <a:t>Frameworks – Since 2010 Frameworks such as Twitter Bootstrap and </a:t>
             </a:r>
             <a:r>
-              <a:rPr lang="en-US" baseline="0" dirty="0" err="1" smtClean="0"/>
+              <a:rPr lang="en-US" baseline="0" dirty="0" err="1"/>
               <a:t>Zurb</a:t>
             </a:r>
             <a:r>
-              <a:rPr lang="en-US" baseline="0" dirty="0" smtClean="0"/>
+              <a:rPr lang="en-US" baseline="0" dirty="0"/>
               <a:t> Foundation were very prominent with bootstrap being over 15 percent of the internet https://trends.builtwith.com/docinfo/Twitter-Bootstrap</a:t>
             </a:r>
           </a:p>
           <a:p>
             <a:r>
-              <a:rPr lang="en-US" baseline="0" dirty="0" smtClean="0"/>
+              <a:rPr lang="en-US" baseline="0" dirty="0"/>
               <a:t>Responsive – Using media queries responsive has become a standard with around half of the web traffic coming from mobile devices, it is important that various viewports are under consideration when making a site.</a:t>
             </a:r>
             <a:endParaRPr lang="en-US" dirty="0"/>
@@ -669,54 +672,54 @@
           <a:lstStyle/>
           <a:p>
             <a:r>
-              <a:rPr lang="en-US" dirty="0" smtClean="0"/>
+              <a:rPr lang="en-US" dirty="0"/>
               <a:t>With Flexbox the content,</a:t>
             </a:r>
             <a:r>
-              <a:rPr lang="en-US" baseline="0" dirty="0" smtClean="0"/>
+              <a:rPr lang="en-US" baseline="0" dirty="0"/>
               <a:t> to some degree, decides the layout. With Grid you are putting your structure first and foremost.</a:t>
             </a:r>
-            <a:endParaRPr lang="en-US" dirty="0" smtClean="0"/>
-          </a:p>
-          <a:p>
-            <a:r>
-              <a:rPr lang="en-US" dirty="0" smtClean="0"/>
+            <a:endParaRPr lang="en-US" dirty="0"/>
+          </a:p>
+          <a:p>
+            <a:r>
+              <a:rPr lang="en-US" dirty="0"/>
               <a:t>Similar items – lists of items</a:t>
             </a:r>
           </a:p>
           <a:p>
             <a:r>
-              <a:rPr lang="en-US" dirty="0" smtClean="0"/>
+              <a:rPr lang="en-US" dirty="0"/>
               <a:t>Macro elements –</a:t>
             </a:r>
             <a:r>
-              <a:rPr lang="en-US" baseline="0" dirty="0" smtClean="0"/>
+              <a:rPr lang="en-US" baseline="0" dirty="0"/>
               <a:t> header, footer, aside, content</a:t>
             </a:r>
-            <a:endParaRPr lang="en-US" dirty="0" smtClean="0"/>
-          </a:p>
-          <a:p>
-            <a:endParaRPr lang="en-US" dirty="0" smtClean="0"/>
-          </a:p>
-          <a:p>
-            <a:endParaRPr lang="en-US" dirty="0" smtClean="0"/>
-          </a:p>
-          <a:p>
-            <a:r>
-              <a:rPr lang="en-US" dirty="0" smtClean="0"/>
+            <a:endParaRPr lang="en-US" dirty="0"/>
+          </a:p>
+          <a:p>
+            <a:endParaRPr lang="en-US" dirty="0"/>
+          </a:p>
+          <a:p>
+            <a:endParaRPr lang="en-US" dirty="0"/>
+          </a:p>
+          <a:p>
+            <a:r>
+              <a:rPr lang="en-US" dirty="0"/>
               <a:t>GRID</a:t>
             </a:r>
             <a:r>
-              <a:rPr lang="en-US" baseline="0" dirty="0" smtClean="0"/>
+              <a:rPr lang="en-US" baseline="0" dirty="0"/>
               <a:t> – IE 10+11 supports 2011 spec</a:t>
             </a:r>
           </a:p>
           <a:p>
-            <a:endParaRPr lang="en-US" baseline="0" dirty="0" smtClean="0"/>
-          </a:p>
-          <a:p>
-            <a:r>
-              <a:rPr lang="en-US" baseline="0" dirty="0" smtClean="0"/>
+            <a:endParaRPr lang="en-US" baseline="0" dirty="0"/>
+          </a:p>
+          <a:p>
+            <a:r>
+              <a:rPr lang="en-US" baseline="0" dirty="0"/>
               <a:t>Table-like support but separating content and presentation</a:t>
             </a:r>
             <a:endParaRPr lang="en-US" dirty="0"/>
@@ -804,22 +807,21 @@
           <a:lstStyle/>
           <a:p>
             <a:r>
-              <a:rPr lang="en-US" dirty="0" smtClean="0"/>
+              <a:rPr lang="en-US" dirty="0"/>
               <a:t>Solutions</a:t>
             </a:r>
           </a:p>
           <a:p>
             <a:r>
-              <a:rPr lang="en-US" dirty="0" smtClean="0"/>
+              <a:rPr lang="en-US" dirty="0"/>
               <a:t>http://www.agreatdaytocode.com/flexbox-froggy/</a:t>
             </a:r>
           </a:p>
           <a:p>
             <a:r>
-              <a:rPr lang="en-US" dirty="0" smtClean="0"/>
+              <a:rPr lang="en-US" dirty="0"/>
               <a:t>https://programmingmentor.com/post/playing-css-grid-garden/</a:t>
             </a:r>
-            <a:endParaRPr lang="en-US" dirty="0"/>
           </a:p>
         </p:txBody>
       </p:sp>
@@ -915,7 +917,7 @@
           </a:lstStyle>
           <a:p>
             <a:r>
-              <a:rPr lang="en-US" smtClean="0"/>
+              <a:rPr lang="en-US"/>
               <a:t>Click to edit Master title style</a:t>
             </a:r>
             <a:endParaRPr lang="en-US" dirty="0"/>
@@ -991,7 +993,7 @@
           </a:lstStyle>
           <a:p>
             <a:r>
-              <a:rPr lang="en-US" smtClean="0"/>
+              <a:rPr lang="en-US"/>
               <a:t>Click to edit Master subtitle style</a:t>
             </a:r>
             <a:endParaRPr lang="en-US" dirty="0"/>
@@ -1274,7 +1276,7 @@
           <a:lstStyle/>
           <a:p>
             <a:r>
-              <a:rPr lang="en-US" smtClean="0"/>
+              <a:rPr lang="en-US"/>
               <a:t>Click to edit Master title style</a:t>
             </a:r>
             <a:endParaRPr lang="en-US" dirty="0"/>
@@ -1303,35 +1305,35 @@
           <a:p>
             <a:pPr lvl="0"/>
             <a:r>
-              <a:rPr lang="en-US" smtClean="0"/>
+              <a:rPr lang="en-US"/>
               <a:t>Click to edit Master text styles</a:t>
             </a:r>
           </a:p>
           <a:p>
             <a:pPr lvl="1"/>
             <a:r>
-              <a:rPr lang="en-US" smtClean="0"/>
+              <a:rPr lang="en-US"/>
               <a:t>Second level</a:t>
             </a:r>
           </a:p>
           <a:p>
             <a:pPr lvl="2"/>
             <a:r>
-              <a:rPr lang="en-US" smtClean="0"/>
+              <a:rPr lang="en-US"/>
               <a:t>Third level</a:t>
             </a:r>
           </a:p>
           <a:p>
             <a:pPr lvl="3"/>
             <a:r>
-              <a:rPr lang="en-US" smtClean="0"/>
+              <a:rPr lang="en-US"/>
               <a:t>Fourth level</a:t>
             </a:r>
           </a:p>
           <a:p>
             <a:pPr lvl="4"/>
             <a:r>
-              <a:rPr lang="en-US" smtClean="0"/>
+              <a:rPr lang="en-US"/>
               <a:t>Fifth level</a:t>
             </a:r>
             <a:endParaRPr lang="en-US" dirty="0"/>
@@ -1449,7 +1451,7 @@
           <a:lstStyle/>
           <a:p>
             <a:r>
-              <a:rPr lang="en-US" smtClean="0"/>
+              <a:rPr lang="en-US"/>
               <a:t>Click to edit Master title style</a:t>
             </a:r>
             <a:endParaRPr lang="en-US" dirty="0"/>
@@ -1478,35 +1480,35 @@
           <a:p>
             <a:pPr lvl="0"/>
             <a:r>
-              <a:rPr lang="en-US" smtClean="0"/>
+              <a:rPr lang="en-US"/>
               <a:t>Click to edit Master text styles</a:t>
             </a:r>
           </a:p>
           <a:p>
             <a:pPr lvl="1"/>
             <a:r>
-              <a:rPr lang="en-US" smtClean="0"/>
+              <a:rPr lang="en-US"/>
               <a:t>Second level</a:t>
             </a:r>
           </a:p>
           <a:p>
             <a:pPr lvl="2"/>
             <a:r>
-              <a:rPr lang="en-US" smtClean="0"/>
+              <a:rPr lang="en-US"/>
               <a:t>Third level</a:t>
             </a:r>
           </a:p>
           <a:p>
             <a:pPr lvl="3"/>
             <a:r>
-              <a:rPr lang="en-US" smtClean="0"/>
+              <a:rPr lang="en-US"/>
               <a:t>Fourth level</a:t>
             </a:r>
           </a:p>
           <a:p>
             <a:pPr lvl="4"/>
             <a:r>
-              <a:rPr lang="en-US" smtClean="0"/>
+              <a:rPr lang="en-US"/>
               <a:t>Fifth level</a:t>
             </a:r>
             <a:endParaRPr lang="en-US" dirty="0"/>
@@ -1619,7 +1621,7 @@
           <a:lstStyle/>
           <a:p>
             <a:r>
-              <a:rPr lang="en-US" smtClean="0"/>
+              <a:rPr lang="en-US"/>
               <a:t>Click to edit Master title style</a:t>
             </a:r>
             <a:endParaRPr lang="en-US" dirty="0"/>
@@ -1643,35 +1645,35 @@
           <a:p>
             <a:pPr lvl="0"/>
             <a:r>
-              <a:rPr lang="en-US" smtClean="0"/>
+              <a:rPr lang="en-US"/>
               <a:t>Click to edit Master text styles</a:t>
             </a:r>
           </a:p>
           <a:p>
             <a:pPr lvl="1"/>
             <a:r>
-              <a:rPr lang="en-US" smtClean="0"/>
+              <a:rPr lang="en-US"/>
               <a:t>Second level</a:t>
             </a:r>
           </a:p>
           <a:p>
             <a:pPr lvl="2"/>
             <a:r>
-              <a:rPr lang="en-US" smtClean="0"/>
+              <a:rPr lang="en-US"/>
               <a:t>Third level</a:t>
             </a:r>
           </a:p>
           <a:p>
             <a:pPr lvl="3"/>
             <a:r>
-              <a:rPr lang="en-US" smtClean="0"/>
+              <a:rPr lang="en-US"/>
               <a:t>Fourth level</a:t>
             </a:r>
           </a:p>
           <a:p>
             <a:pPr lvl="4"/>
             <a:r>
-              <a:rPr lang="en-US" smtClean="0"/>
+              <a:rPr lang="en-US"/>
               <a:t>Fifth level</a:t>
             </a:r>
             <a:endParaRPr lang="en-US" dirty="0"/>
@@ -1804,7 +1806,7 @@
           </a:lstStyle>
           <a:p>
             <a:r>
-              <a:rPr lang="en-US" smtClean="0"/>
+              <a:rPr lang="en-US"/>
               <a:t>Click to edit Master title style</a:t>
             </a:r>
             <a:endParaRPr lang="en-US" dirty="0"/>
@@ -1931,7 +1933,7 @@
           <a:p>
             <a:pPr lvl="0"/>
             <a:r>
-              <a:rPr lang="en-US" smtClean="0"/>
+              <a:rPr lang="en-US"/>
               <a:t>Click to edit Master text styles</a:t>
             </a:r>
           </a:p>
@@ -2148,7 +2150,7 @@
           </a:lstStyle>
           <a:p>
             <a:r>
-              <a:rPr lang="en-US" smtClean="0"/>
+              <a:rPr lang="en-US"/>
               <a:t>Click to edit Master title style</a:t>
             </a:r>
             <a:endParaRPr lang="en-US" dirty="0"/>
@@ -2213,35 +2215,35 @@
           <a:p>
             <a:pPr lvl="0"/>
             <a:r>
-              <a:rPr lang="en-US" smtClean="0"/>
+              <a:rPr lang="en-US"/>
               <a:t>Click to edit Master text styles</a:t>
             </a:r>
           </a:p>
           <a:p>
             <a:pPr lvl="1"/>
             <a:r>
-              <a:rPr lang="en-US" smtClean="0"/>
+              <a:rPr lang="en-US"/>
               <a:t>Second level</a:t>
             </a:r>
           </a:p>
           <a:p>
             <a:pPr lvl="2"/>
             <a:r>
-              <a:rPr lang="en-US" smtClean="0"/>
+              <a:rPr lang="en-US"/>
               <a:t>Third level</a:t>
             </a:r>
           </a:p>
           <a:p>
             <a:pPr lvl="3"/>
             <a:r>
-              <a:rPr lang="en-US" smtClean="0"/>
+              <a:rPr lang="en-US"/>
               <a:t>Fourth level</a:t>
             </a:r>
           </a:p>
           <a:p>
             <a:pPr lvl="4"/>
             <a:r>
-              <a:rPr lang="en-US" smtClean="0"/>
+              <a:rPr lang="en-US"/>
               <a:t>Fifth level</a:t>
             </a:r>
             <a:endParaRPr lang="en-US" dirty="0"/>
@@ -2306,35 +2308,35 @@
           <a:p>
             <a:pPr lvl="0"/>
             <a:r>
-              <a:rPr lang="en-US" smtClean="0"/>
+              <a:rPr lang="en-US"/>
               <a:t>Click to edit Master text styles</a:t>
             </a:r>
           </a:p>
           <a:p>
             <a:pPr lvl="1"/>
             <a:r>
-              <a:rPr lang="en-US" smtClean="0"/>
+              <a:rPr lang="en-US"/>
               <a:t>Second level</a:t>
             </a:r>
           </a:p>
           <a:p>
             <a:pPr lvl="2"/>
             <a:r>
-              <a:rPr lang="en-US" smtClean="0"/>
+              <a:rPr lang="en-US"/>
               <a:t>Third level</a:t>
             </a:r>
           </a:p>
           <a:p>
             <a:pPr lvl="3"/>
             <a:r>
-              <a:rPr lang="en-US" smtClean="0"/>
+              <a:rPr lang="en-US"/>
               <a:t>Fourth level</a:t>
             </a:r>
           </a:p>
           <a:p>
             <a:pPr lvl="4"/>
             <a:r>
-              <a:rPr lang="en-US" smtClean="0"/>
+              <a:rPr lang="en-US"/>
               <a:t>Fifth level</a:t>
             </a:r>
             <a:endParaRPr lang="en-US" dirty="0"/>
@@ -2460,7 +2462,7 @@
           </a:lstStyle>
           <a:p>
             <a:r>
-              <a:rPr lang="en-US" smtClean="0"/>
+              <a:rPr lang="en-US"/>
               <a:t>Click to edit Master title style</a:t>
             </a:r>
             <a:endParaRPr lang="en-US" dirty="0"/>
@@ -2541,7 +2543,7 @@
           <a:p>
             <a:pPr lvl="0"/>
             <a:r>
-              <a:rPr lang="en-US" smtClean="0"/>
+              <a:rPr lang="en-US"/>
               <a:t>Click to edit Master text styles</a:t>
             </a:r>
           </a:p>
@@ -2605,35 +2607,35 @@
           <a:p>
             <a:pPr lvl="0"/>
             <a:r>
-              <a:rPr lang="en-US" smtClean="0"/>
+              <a:rPr lang="en-US"/>
               <a:t>Click to edit Master text styles</a:t>
             </a:r>
           </a:p>
           <a:p>
             <a:pPr lvl="1"/>
             <a:r>
-              <a:rPr lang="en-US" smtClean="0"/>
+              <a:rPr lang="en-US"/>
               <a:t>Second level</a:t>
             </a:r>
           </a:p>
           <a:p>
             <a:pPr lvl="2"/>
             <a:r>
-              <a:rPr lang="en-US" smtClean="0"/>
+              <a:rPr lang="en-US"/>
               <a:t>Third level</a:t>
             </a:r>
           </a:p>
           <a:p>
             <a:pPr lvl="3"/>
             <a:r>
-              <a:rPr lang="en-US" smtClean="0"/>
+              <a:rPr lang="en-US"/>
               <a:t>Fourth level</a:t>
             </a:r>
           </a:p>
           <a:p>
             <a:pPr lvl="4"/>
             <a:r>
-              <a:rPr lang="en-US" smtClean="0"/>
+              <a:rPr lang="en-US"/>
               <a:t>Fifth level</a:t>
             </a:r>
             <a:endParaRPr lang="en-US" dirty="0"/>
@@ -2714,7 +2716,7 @@
           <a:p>
             <a:pPr lvl="0"/>
             <a:r>
-              <a:rPr lang="en-US" smtClean="0"/>
+              <a:rPr lang="en-US"/>
               <a:t>Click to edit Master text styles</a:t>
             </a:r>
           </a:p>
@@ -2778,35 +2780,35 @@
           <a:p>
             <a:pPr lvl="0"/>
             <a:r>
-              <a:rPr lang="en-US" smtClean="0"/>
+              <a:rPr lang="en-US"/>
               <a:t>Click to edit Master text styles</a:t>
             </a:r>
           </a:p>
           <a:p>
             <a:pPr lvl="1"/>
             <a:r>
-              <a:rPr lang="en-US" smtClean="0"/>
+              <a:rPr lang="en-US"/>
               <a:t>Second level</a:t>
             </a:r>
           </a:p>
           <a:p>
             <a:pPr lvl="2"/>
             <a:r>
-              <a:rPr lang="en-US" smtClean="0"/>
+              <a:rPr lang="en-US"/>
               <a:t>Third level</a:t>
             </a:r>
           </a:p>
           <a:p>
             <a:pPr lvl="3"/>
             <a:r>
-              <a:rPr lang="en-US" smtClean="0"/>
+              <a:rPr lang="en-US"/>
               <a:t>Fourth level</a:t>
             </a:r>
           </a:p>
           <a:p>
             <a:pPr lvl="4"/>
             <a:r>
-              <a:rPr lang="en-US" smtClean="0"/>
+              <a:rPr lang="en-US"/>
               <a:t>Fifth level</a:t>
             </a:r>
             <a:endParaRPr lang="en-US" dirty="0"/>
@@ -2919,7 +2921,7 @@
           <a:lstStyle/>
           <a:p>
             <a:r>
-              <a:rPr lang="en-US" smtClean="0"/>
+              <a:rPr lang="en-US"/>
               <a:t>Click to edit Master title style</a:t>
             </a:r>
             <a:endParaRPr lang="en-US" dirty="0"/>
@@ -3178,7 +3180,7 @@
           </a:lstStyle>
           <a:p>
             <a:r>
-              <a:rPr lang="en-US" smtClean="0"/>
+              <a:rPr lang="en-US"/>
               <a:t>Click to edit Master title style</a:t>
             </a:r>
             <a:endParaRPr lang="en-US" dirty="0"/>
@@ -3235,35 +3237,35 @@
           <a:p>
             <a:pPr lvl="0"/>
             <a:r>
-              <a:rPr lang="en-US" smtClean="0"/>
+              <a:rPr lang="en-US"/>
               <a:t>Click to edit Master text styles</a:t>
             </a:r>
           </a:p>
           <a:p>
             <a:pPr lvl="1"/>
             <a:r>
-              <a:rPr lang="en-US" smtClean="0"/>
+              <a:rPr lang="en-US"/>
               <a:t>Second level</a:t>
             </a:r>
           </a:p>
           <a:p>
             <a:pPr lvl="2"/>
             <a:r>
-              <a:rPr lang="en-US" smtClean="0"/>
+              <a:rPr lang="en-US"/>
               <a:t>Third level</a:t>
             </a:r>
           </a:p>
           <a:p>
             <a:pPr lvl="3"/>
             <a:r>
-              <a:rPr lang="en-US" smtClean="0"/>
+              <a:rPr lang="en-US"/>
               <a:t>Fourth level</a:t>
             </a:r>
           </a:p>
           <a:p>
             <a:pPr lvl="4"/>
             <a:r>
-              <a:rPr lang="en-US" smtClean="0"/>
+              <a:rPr lang="en-US"/>
               <a:t>Fifth level</a:t>
             </a:r>
             <a:endParaRPr lang="en-US" dirty="0"/>
@@ -3338,7 +3340,7 @@
           <a:p>
             <a:pPr lvl="0"/>
             <a:r>
-              <a:rPr lang="en-US" smtClean="0"/>
+              <a:rPr lang="en-US"/>
               <a:t>Click to edit Master text styles</a:t>
             </a:r>
           </a:p>
@@ -3581,7 +3583,7 @@
           </a:lstStyle>
           <a:p>
             <a:r>
-              <a:rPr lang="en-US" smtClean="0"/>
+              <a:rPr lang="en-US"/>
               <a:t>Click to edit Master title style</a:t>
             </a:r>
             <a:endParaRPr lang="en-US" dirty="0"/>
@@ -3648,7 +3650,7 @@
           </a:lstStyle>
           <a:p>
             <a:r>
-              <a:rPr lang="en-US" smtClean="0"/>
+              <a:rPr lang="en-US"/>
               <a:t>Drag picture to placeholder or click icon to add</a:t>
             </a:r>
             <a:endParaRPr lang="en-US" dirty="0"/>
@@ -3723,7 +3725,7 @@
           <a:p>
             <a:pPr lvl="0"/>
             <a:r>
-              <a:rPr lang="en-US" smtClean="0"/>
+              <a:rPr lang="en-US"/>
               <a:t>Click to edit Master text styles</a:t>
             </a:r>
           </a:p>
@@ -3932,7 +3934,7 @@
           <a:lstStyle/>
           <a:p>
             <a:r>
-              <a:rPr lang="en-US" smtClean="0"/>
+              <a:rPr lang="en-US"/>
               <a:t>Click to edit Master title style</a:t>
             </a:r>
             <a:endParaRPr lang="en-US" dirty="0"/>
@@ -3966,35 +3968,35 @@
           <a:p>
             <a:pPr lvl="0"/>
             <a:r>
-              <a:rPr lang="en-US" smtClean="0"/>
+              <a:rPr lang="en-US"/>
               <a:t>Click to edit Master text styles</a:t>
             </a:r>
           </a:p>
           <a:p>
             <a:pPr lvl="1"/>
             <a:r>
-              <a:rPr lang="en-US" smtClean="0"/>
+              <a:rPr lang="en-US"/>
               <a:t>Second level</a:t>
             </a:r>
           </a:p>
           <a:p>
             <a:pPr lvl="2"/>
             <a:r>
-              <a:rPr lang="en-US" smtClean="0"/>
+              <a:rPr lang="en-US"/>
               <a:t>Third level</a:t>
             </a:r>
           </a:p>
           <a:p>
             <a:pPr lvl="3"/>
             <a:r>
-              <a:rPr lang="en-US" smtClean="0"/>
+              <a:rPr lang="en-US"/>
               <a:t>Fourth level</a:t>
             </a:r>
           </a:p>
           <a:p>
             <a:pPr lvl="4"/>
             <a:r>
-              <a:rPr lang="en-US" smtClean="0"/>
+              <a:rPr lang="en-US"/>
               <a:t>Fifth level</a:t>
             </a:r>
             <a:endParaRPr lang="en-US" dirty="0"/>
@@ -4559,18 +4561,20 @@
           <a:lstStyle/>
           <a:p>
             <a:r>
-              <a:rPr lang="en-US" dirty="0" smtClean="0"/>
-              <a:t>Flex and </a:t>
-            </a:r>
-            <a:r>
-              <a:rPr lang="en-US" dirty="0" err="1" smtClean="0"/>
+              <a:rPr lang="en-US" dirty="0"/>
+              <a:t>Flexbox and</a:t>
+            </a:r>
+            <a:br>
+              <a:rPr lang="en-US" dirty="0"/>
+            </a:br>
+            <a:r>
+              <a:rPr lang="en-US" dirty="0" err="1"/>
               <a:t>css</a:t>
             </a:r>
             <a:r>
-              <a:rPr lang="en-US" dirty="0" smtClean="0"/>
+              <a:rPr lang="en-US" dirty="0"/>
               <a:t> Grid</a:t>
             </a:r>
-            <a:endParaRPr lang="en-US" dirty="0"/>
           </a:p>
         </p:txBody>
       </p:sp>
@@ -4590,8 +4594,16 @@
           <a:lstStyle/>
           <a:p>
             <a:r>
-              <a:rPr lang="en-US" dirty="0" smtClean="0"/>
+              <a:rPr lang="en-US" dirty="0"/>
               <a:t>Shawn Hellwege</a:t>
+            </a:r>
+          </a:p>
+          <a:p>
+            <a:r>
+              <a:rPr lang="en-US">
+                <a:hlinkClick r:id="rId2"/>
+              </a:rPr>
+              <a:t>https://github.com/shellwe/Flexbox_Grid/</a:t>
             </a:r>
             <a:endParaRPr lang="en-US" dirty="0"/>
           </a:p>
@@ -4643,10 +4655,9 @@
           <a:lstStyle/>
           <a:p>
             <a:r>
-              <a:rPr lang="en-US" dirty="0" smtClean="0"/>
+              <a:rPr lang="en-US" dirty="0"/>
               <a:t>A brief history of layouts</a:t>
             </a:r>
-            <a:endParaRPr lang="en-US" dirty="0"/>
           </a:p>
         </p:txBody>
       </p:sp>
@@ -4673,55 +4684,55 @@
           <a:lstStyle/>
           <a:p>
             <a:r>
-              <a:rPr lang="en-US" dirty="0" smtClean="0"/>
+              <a:rPr lang="en-US" dirty="0"/>
               <a:t>Plain text</a:t>
             </a:r>
           </a:p>
           <a:p>
             <a:r>
-              <a:rPr lang="en-US" dirty="0" smtClean="0"/>
+              <a:rPr lang="en-US" dirty="0"/>
               <a:t>Stacked content</a:t>
             </a:r>
           </a:p>
           <a:p>
             <a:r>
-              <a:rPr lang="en-US" dirty="0" smtClean="0"/>
+              <a:rPr lang="en-US" dirty="0"/>
               <a:t>Tables</a:t>
             </a:r>
           </a:p>
           <a:p>
             <a:r>
-              <a:rPr lang="en-US" dirty="0" smtClean="0"/>
+              <a:rPr lang="en-US" dirty="0"/>
               <a:t>Flash</a:t>
             </a:r>
           </a:p>
           <a:p>
             <a:r>
-              <a:rPr lang="en-US" dirty="0" smtClean="0"/>
+              <a:rPr lang="en-US" dirty="0"/>
               <a:t>CSS</a:t>
             </a:r>
           </a:p>
           <a:p>
             <a:r>
-              <a:rPr lang="en-US" dirty="0" smtClean="0"/>
+              <a:rPr lang="en-US" dirty="0"/>
               <a:t>Flexbox</a:t>
             </a:r>
           </a:p>
           <a:p>
             <a:r>
-              <a:rPr lang="en-US" dirty="0" smtClean="0"/>
+              <a:rPr lang="en-US" dirty="0"/>
               <a:t>Frameworks</a:t>
             </a:r>
           </a:p>
           <a:p>
             <a:r>
-              <a:rPr lang="en-US" dirty="0" smtClean="0"/>
+              <a:rPr lang="en-US" dirty="0"/>
               <a:t>Responsive</a:t>
             </a:r>
           </a:p>
           <a:p>
             <a:r>
-              <a:rPr lang="en-US" dirty="0" smtClean="0"/>
+              <a:rPr lang="en-US" dirty="0"/>
               <a:t>CSS Grids</a:t>
             </a:r>
           </a:p>
@@ -4740,6 +4751,480 @@
   <p:clrMapOvr>
     <a:masterClrMapping/>
   </p:clrMapOvr>
+  <p:timing>
+    <p:tnLst>
+      <p:par>
+        <p:cTn id="1" dur="indefinite" restart="never" nodeType="tmRoot">
+          <p:childTnLst>
+            <p:seq concurrent="1" nextAc="seek">
+              <p:cTn id="2" dur="indefinite" nodeType="mainSeq">
+                <p:childTnLst>
+                  <p:par>
+                    <p:cTn id="3" fill="hold">
+                      <p:stCondLst>
+                        <p:cond delay="indefinite"/>
+                      </p:stCondLst>
+                      <p:childTnLst>
+                        <p:par>
+                          <p:cTn id="4" fill="hold">
+                            <p:stCondLst>
+                              <p:cond delay="0"/>
+                            </p:stCondLst>
+                            <p:childTnLst>
+                              <p:par>
+                                <p:cTn id="5" presetID="1" presetClass="entr" presetSubtype="0" fill="hold" grpId="0" nodeType="clickEffect">
+                                  <p:stCondLst>
+                                    <p:cond delay="0"/>
+                                  </p:stCondLst>
+                                  <p:childTnLst>
+                                    <p:set>
+                                      <p:cBhvr>
+                                        <p:cTn id="6" dur="1" fill="hold">
+                                          <p:stCondLst>
+                                            <p:cond delay="0"/>
+                                          </p:stCondLst>
+                                        </p:cTn>
+                                        <p:tgtEl>
+                                          <p:spTgt spid="3">
+                                            <p:txEl>
+                                              <p:pRg st="0" end="0"/>
+                                            </p:txEl>
+                                          </p:spTgt>
+                                        </p:tgtEl>
+                                        <p:attrNameLst>
+                                          <p:attrName>style.visibility</p:attrName>
+                                        </p:attrNameLst>
+                                      </p:cBhvr>
+                                      <p:to>
+                                        <p:strVal val="visible"/>
+                                      </p:to>
+                                    </p:set>
+                                  </p:childTnLst>
+                                </p:cTn>
+                              </p:par>
+                            </p:childTnLst>
+                          </p:cTn>
+                        </p:par>
+                      </p:childTnLst>
+                    </p:cTn>
+                  </p:par>
+                  <p:par>
+                    <p:cTn id="7" fill="hold">
+                      <p:stCondLst>
+                        <p:cond delay="indefinite"/>
+                      </p:stCondLst>
+                      <p:childTnLst>
+                        <p:par>
+                          <p:cTn id="8" fill="hold">
+                            <p:stCondLst>
+                              <p:cond delay="0"/>
+                            </p:stCondLst>
+                            <p:childTnLst>
+                              <p:par>
+                                <p:cTn id="9" presetID="1" presetClass="entr" presetSubtype="0" fill="hold" grpId="0" nodeType="clickEffect">
+                                  <p:stCondLst>
+                                    <p:cond delay="0"/>
+                                  </p:stCondLst>
+                                  <p:childTnLst>
+                                    <p:set>
+                                      <p:cBhvr>
+                                        <p:cTn id="10" dur="1" fill="hold">
+                                          <p:stCondLst>
+                                            <p:cond delay="0"/>
+                                          </p:stCondLst>
+                                        </p:cTn>
+                                        <p:tgtEl>
+                                          <p:spTgt spid="3">
+                                            <p:txEl>
+                                              <p:pRg st="1" end="1"/>
+                                            </p:txEl>
+                                          </p:spTgt>
+                                        </p:tgtEl>
+                                        <p:attrNameLst>
+                                          <p:attrName>style.visibility</p:attrName>
+                                        </p:attrNameLst>
+                                      </p:cBhvr>
+                                      <p:to>
+                                        <p:strVal val="visible"/>
+                                      </p:to>
+                                    </p:set>
+                                  </p:childTnLst>
+                                </p:cTn>
+                              </p:par>
+                            </p:childTnLst>
+                          </p:cTn>
+                        </p:par>
+                      </p:childTnLst>
+                    </p:cTn>
+                  </p:par>
+                  <p:par>
+                    <p:cTn id="11" fill="hold">
+                      <p:stCondLst>
+                        <p:cond delay="indefinite"/>
+                      </p:stCondLst>
+                      <p:childTnLst>
+                        <p:par>
+                          <p:cTn id="12" fill="hold">
+                            <p:stCondLst>
+                              <p:cond delay="0"/>
+                            </p:stCondLst>
+                            <p:childTnLst>
+                              <p:par>
+                                <p:cTn id="13" presetID="1" presetClass="entr" presetSubtype="0" fill="hold" grpId="0" nodeType="clickEffect">
+                                  <p:stCondLst>
+                                    <p:cond delay="0"/>
+                                  </p:stCondLst>
+                                  <p:childTnLst>
+                                    <p:set>
+                                      <p:cBhvr>
+                                        <p:cTn id="14" dur="1" fill="hold">
+                                          <p:stCondLst>
+                                            <p:cond delay="0"/>
+                                          </p:stCondLst>
+                                        </p:cTn>
+                                        <p:tgtEl>
+                                          <p:spTgt spid="3">
+                                            <p:txEl>
+                                              <p:pRg st="2" end="2"/>
+                                            </p:txEl>
+                                          </p:spTgt>
+                                        </p:tgtEl>
+                                        <p:attrNameLst>
+                                          <p:attrName>style.visibility</p:attrName>
+                                        </p:attrNameLst>
+                                      </p:cBhvr>
+                                      <p:to>
+                                        <p:strVal val="visible"/>
+                                      </p:to>
+                                    </p:set>
+                                  </p:childTnLst>
+                                </p:cTn>
+                              </p:par>
+                            </p:childTnLst>
+                          </p:cTn>
+                        </p:par>
+                      </p:childTnLst>
+                    </p:cTn>
+                  </p:par>
+                  <p:par>
+                    <p:cTn id="15" fill="hold">
+                      <p:stCondLst>
+                        <p:cond delay="indefinite"/>
+                      </p:stCondLst>
+                      <p:childTnLst>
+                        <p:par>
+                          <p:cTn id="16" fill="hold">
+                            <p:stCondLst>
+                              <p:cond delay="0"/>
+                            </p:stCondLst>
+                            <p:childTnLst>
+                              <p:par>
+                                <p:cTn id="17" presetID="1" presetClass="entr" presetSubtype="0" fill="hold" grpId="0" nodeType="clickEffect">
+                                  <p:stCondLst>
+                                    <p:cond delay="0"/>
+                                  </p:stCondLst>
+                                  <p:childTnLst>
+                                    <p:set>
+                                      <p:cBhvr>
+                                        <p:cTn id="18" dur="1" fill="hold">
+                                          <p:stCondLst>
+                                            <p:cond delay="0"/>
+                                          </p:stCondLst>
+                                        </p:cTn>
+                                        <p:tgtEl>
+                                          <p:spTgt spid="3">
+                                            <p:txEl>
+                                              <p:pRg st="3" end="3"/>
+                                            </p:txEl>
+                                          </p:spTgt>
+                                        </p:tgtEl>
+                                        <p:attrNameLst>
+                                          <p:attrName>style.visibility</p:attrName>
+                                        </p:attrNameLst>
+                                      </p:cBhvr>
+                                      <p:to>
+                                        <p:strVal val="visible"/>
+                                      </p:to>
+                                    </p:set>
+                                  </p:childTnLst>
+                                </p:cTn>
+                              </p:par>
+                            </p:childTnLst>
+                          </p:cTn>
+                        </p:par>
+                      </p:childTnLst>
+                    </p:cTn>
+                  </p:par>
+                  <p:par>
+                    <p:cTn id="19" fill="hold">
+                      <p:stCondLst>
+                        <p:cond delay="indefinite"/>
+                      </p:stCondLst>
+                      <p:childTnLst>
+                        <p:par>
+                          <p:cTn id="20" fill="hold">
+                            <p:stCondLst>
+                              <p:cond delay="0"/>
+                            </p:stCondLst>
+                            <p:childTnLst>
+                              <p:par>
+                                <p:cTn id="21" presetID="1" presetClass="entr" presetSubtype="0" fill="hold" grpId="0" nodeType="clickEffect">
+                                  <p:stCondLst>
+                                    <p:cond delay="0"/>
+                                  </p:stCondLst>
+                                  <p:childTnLst>
+                                    <p:set>
+                                      <p:cBhvr>
+                                        <p:cTn id="22" dur="1" fill="hold">
+                                          <p:stCondLst>
+                                            <p:cond delay="0"/>
+                                          </p:stCondLst>
+                                        </p:cTn>
+                                        <p:tgtEl>
+                                          <p:spTgt spid="3">
+                                            <p:txEl>
+                                              <p:pRg st="4" end="4"/>
+                                            </p:txEl>
+                                          </p:spTgt>
+                                        </p:tgtEl>
+                                        <p:attrNameLst>
+                                          <p:attrName>style.visibility</p:attrName>
+                                        </p:attrNameLst>
+                                      </p:cBhvr>
+                                      <p:to>
+                                        <p:strVal val="visible"/>
+                                      </p:to>
+                                    </p:set>
+                                  </p:childTnLst>
+                                </p:cTn>
+                              </p:par>
+                            </p:childTnLst>
+                          </p:cTn>
+                        </p:par>
+                      </p:childTnLst>
+                    </p:cTn>
+                  </p:par>
+                  <p:par>
+                    <p:cTn id="23" fill="hold">
+                      <p:stCondLst>
+                        <p:cond delay="indefinite"/>
+                      </p:stCondLst>
+                      <p:childTnLst>
+                        <p:par>
+                          <p:cTn id="24" fill="hold">
+                            <p:stCondLst>
+                              <p:cond delay="0"/>
+                            </p:stCondLst>
+                            <p:childTnLst>
+                              <p:par>
+                                <p:cTn id="25" presetID="1" presetClass="entr" presetSubtype="0" fill="hold" grpId="0" nodeType="clickEffect">
+                                  <p:stCondLst>
+                                    <p:cond delay="0"/>
+                                  </p:stCondLst>
+                                  <p:childTnLst>
+                                    <p:set>
+                                      <p:cBhvr>
+                                        <p:cTn id="26" dur="1" fill="hold">
+                                          <p:stCondLst>
+                                            <p:cond delay="0"/>
+                                          </p:stCondLst>
+                                        </p:cTn>
+                                        <p:tgtEl>
+                                          <p:spTgt spid="3">
+                                            <p:txEl>
+                                              <p:pRg st="5" end="5"/>
+                                            </p:txEl>
+                                          </p:spTgt>
+                                        </p:tgtEl>
+                                        <p:attrNameLst>
+                                          <p:attrName>style.visibility</p:attrName>
+                                        </p:attrNameLst>
+                                      </p:cBhvr>
+                                      <p:to>
+                                        <p:strVal val="visible"/>
+                                      </p:to>
+                                    </p:set>
+                                  </p:childTnLst>
+                                </p:cTn>
+                              </p:par>
+                            </p:childTnLst>
+                          </p:cTn>
+                        </p:par>
+                      </p:childTnLst>
+                    </p:cTn>
+                  </p:par>
+                  <p:par>
+                    <p:cTn id="27" fill="hold">
+                      <p:stCondLst>
+                        <p:cond delay="indefinite"/>
+                      </p:stCondLst>
+                      <p:childTnLst>
+                        <p:par>
+                          <p:cTn id="28" fill="hold">
+                            <p:stCondLst>
+                              <p:cond delay="0"/>
+                            </p:stCondLst>
+                            <p:childTnLst>
+                              <p:par>
+                                <p:cTn id="29" presetID="1" presetClass="entr" presetSubtype="0" fill="hold" grpId="0" nodeType="clickEffect">
+                                  <p:stCondLst>
+                                    <p:cond delay="0"/>
+                                  </p:stCondLst>
+                                  <p:childTnLst>
+                                    <p:set>
+                                      <p:cBhvr>
+                                        <p:cTn id="30" dur="1" fill="hold">
+                                          <p:stCondLst>
+                                            <p:cond delay="0"/>
+                                          </p:stCondLst>
+                                        </p:cTn>
+                                        <p:tgtEl>
+                                          <p:spTgt spid="3">
+                                            <p:txEl>
+                                              <p:pRg st="6" end="6"/>
+                                            </p:txEl>
+                                          </p:spTgt>
+                                        </p:tgtEl>
+                                        <p:attrNameLst>
+                                          <p:attrName>style.visibility</p:attrName>
+                                        </p:attrNameLst>
+                                      </p:cBhvr>
+                                      <p:to>
+                                        <p:strVal val="visible"/>
+                                      </p:to>
+                                    </p:set>
+                                  </p:childTnLst>
+                                </p:cTn>
+                              </p:par>
+                            </p:childTnLst>
+                          </p:cTn>
+                        </p:par>
+                      </p:childTnLst>
+                    </p:cTn>
+                  </p:par>
+                  <p:par>
+                    <p:cTn id="31" fill="hold">
+                      <p:stCondLst>
+                        <p:cond delay="indefinite"/>
+                      </p:stCondLst>
+                      <p:childTnLst>
+                        <p:par>
+                          <p:cTn id="32" fill="hold">
+                            <p:stCondLst>
+                              <p:cond delay="0"/>
+                            </p:stCondLst>
+                            <p:childTnLst>
+                              <p:par>
+                                <p:cTn id="33" presetID="1" presetClass="entr" presetSubtype="0" fill="hold" grpId="0" nodeType="clickEffect">
+                                  <p:stCondLst>
+                                    <p:cond delay="0"/>
+                                  </p:stCondLst>
+                                  <p:childTnLst>
+                                    <p:set>
+                                      <p:cBhvr>
+                                        <p:cTn id="34" dur="1" fill="hold">
+                                          <p:stCondLst>
+                                            <p:cond delay="0"/>
+                                          </p:stCondLst>
+                                        </p:cTn>
+                                        <p:tgtEl>
+                                          <p:spTgt spid="3">
+                                            <p:txEl>
+                                              <p:pRg st="7" end="7"/>
+                                            </p:txEl>
+                                          </p:spTgt>
+                                        </p:tgtEl>
+                                        <p:attrNameLst>
+                                          <p:attrName>style.visibility</p:attrName>
+                                        </p:attrNameLst>
+                                      </p:cBhvr>
+                                      <p:to>
+                                        <p:strVal val="visible"/>
+                                      </p:to>
+                                    </p:set>
+                                  </p:childTnLst>
+                                </p:cTn>
+                              </p:par>
+                            </p:childTnLst>
+                          </p:cTn>
+                        </p:par>
+                      </p:childTnLst>
+                    </p:cTn>
+                  </p:par>
+                  <p:par>
+                    <p:cTn id="35" fill="hold">
+                      <p:stCondLst>
+                        <p:cond delay="indefinite"/>
+                      </p:stCondLst>
+                      <p:childTnLst>
+                        <p:par>
+                          <p:cTn id="36" fill="hold">
+                            <p:stCondLst>
+                              <p:cond delay="0"/>
+                            </p:stCondLst>
+                            <p:childTnLst>
+                              <p:par>
+                                <p:cTn id="37" presetID="1" presetClass="entr" presetSubtype="0" fill="hold" grpId="0" nodeType="clickEffect">
+                                  <p:stCondLst>
+                                    <p:cond delay="0"/>
+                                  </p:stCondLst>
+                                  <p:childTnLst>
+                                    <p:set>
+                                      <p:cBhvr>
+                                        <p:cTn id="38" dur="1" fill="hold">
+                                          <p:stCondLst>
+                                            <p:cond delay="0"/>
+                                          </p:stCondLst>
+                                        </p:cTn>
+                                        <p:tgtEl>
+                                          <p:spTgt spid="3">
+                                            <p:txEl>
+                                              <p:pRg st="8" end="8"/>
+                                            </p:txEl>
+                                          </p:spTgt>
+                                        </p:tgtEl>
+                                        <p:attrNameLst>
+                                          <p:attrName>style.visibility</p:attrName>
+                                        </p:attrNameLst>
+                                      </p:cBhvr>
+                                      <p:to>
+                                        <p:strVal val="visible"/>
+                                      </p:to>
+                                    </p:set>
+                                  </p:childTnLst>
+                                </p:cTn>
+                              </p:par>
+                            </p:childTnLst>
+                          </p:cTn>
+                        </p:par>
+                      </p:childTnLst>
+                    </p:cTn>
+                  </p:par>
+                </p:childTnLst>
+              </p:cTn>
+              <p:prevCondLst>
+                <p:cond evt="onPrev" delay="0">
+                  <p:tgtEl>
+                    <p:sldTgt/>
+                  </p:tgtEl>
+                </p:cond>
+              </p:prevCondLst>
+              <p:nextCondLst>
+                <p:cond evt="onNext" delay="0">
+                  <p:tgtEl>
+                    <p:sldTgt/>
+                  </p:tgtEl>
+                </p:cond>
+              </p:nextCondLst>
+            </p:seq>
+          </p:childTnLst>
+        </p:cTn>
+      </p:par>
+    </p:tnLst>
+    <p:bldLst>
+      <p:bldP spid="3" grpId="0" build="p"/>
+    </p:bldLst>
+  </p:timing>
 </p:sld>
 </file>
 
@@ -4776,10 +5261,9 @@
           <a:lstStyle/>
           <a:p>
             <a:r>
-              <a:rPr lang="en-US" dirty="0" smtClean="0"/>
+              <a:rPr lang="en-US" dirty="0"/>
               <a:t>Flexbox vs CSS Grid</a:t>
             </a:r>
-            <a:endParaRPr lang="en-US" dirty="0"/>
           </a:p>
         </p:txBody>
       </p:sp>
@@ -4799,10 +5283,9 @@
           <a:lstStyle/>
           <a:p>
             <a:r>
-              <a:rPr lang="en-US" dirty="0" smtClean="0"/>
+              <a:rPr lang="en-US" dirty="0"/>
               <a:t>Flexbox</a:t>
             </a:r>
-            <a:endParaRPr lang="en-US" dirty="0"/>
           </a:p>
         </p:txBody>
       </p:sp>
@@ -4829,60 +5312,39 @@
           <a:lstStyle/>
           <a:p>
             <a:r>
-              <a:rPr lang="en-US" dirty="0" smtClean="0"/>
+              <a:rPr lang="en-US" dirty="0"/>
               <a:t>Works from content out</a:t>
             </a:r>
           </a:p>
           <a:p>
             <a:r>
-              <a:rPr lang="en-US" dirty="0" smtClean="0"/>
+              <a:rPr lang="en-US" dirty="0"/>
               <a:t>Well suited for similar items</a:t>
             </a:r>
           </a:p>
           <a:p>
             <a:r>
-              <a:rPr lang="en-US" dirty="0" smtClean="0"/>
-              <a:t>1 </a:t>
-            </a:r>
-            <a:r>
-              <a:rPr lang="en-US" dirty="0" smtClean="0"/>
-              <a:t>dimensional layouts</a:t>
-            </a:r>
-          </a:p>
-          <a:p>
-            <a:r>
-              <a:rPr lang="en-US" dirty="0" smtClean="0"/>
-              <a:t>Better </a:t>
-            </a:r>
-            <a:r>
-              <a:rPr lang="en-US" dirty="0" smtClean="0"/>
-              <a:t>support </a:t>
-            </a:r>
-            <a:r>
-              <a:rPr lang="en-US" dirty="0" smtClean="0"/>
-              <a:t>with older </a:t>
-            </a:r>
-            <a:r>
-              <a:rPr lang="en-US" dirty="0" smtClean="0"/>
-              <a:t>browsers</a:t>
-            </a:r>
-          </a:p>
-          <a:p>
-            <a:r>
               <a:rPr lang="en-US" dirty="0"/>
-              <a:t>Allows wrapping, alignment, </a:t>
-            </a:r>
-            <a:r>
-              <a:rPr lang="en-US" dirty="0" smtClean="0"/>
-              <a:t>justify</a:t>
-            </a:r>
-          </a:p>
-          <a:p>
-            <a:r>
-              <a:rPr lang="en-US" dirty="0" smtClean="0"/>
+              <a:t>1 dimensional layouts</a:t>
+            </a:r>
+          </a:p>
+          <a:p>
+            <a:r>
+              <a:rPr lang="en-US" dirty="0"/>
+              <a:t>Better support with older browsers</a:t>
+            </a:r>
+          </a:p>
+          <a:p>
+            <a:r>
+              <a:rPr lang="en-US" dirty="0"/>
+              <a:t>Allows wrapping, alignment, justify</a:t>
+            </a:r>
+          </a:p>
+          <a:p>
+            <a:r>
+              <a:rPr lang="en-US" dirty="0"/>
               <a:t>Most searched on caniuse.com</a:t>
             </a:r>
-            <a:endParaRPr lang="en-US" dirty="0"/>
           </a:p>
         </p:txBody>
       </p:sp>
@@ -4902,10 +5364,9 @@
           <a:lstStyle/>
           <a:p>
             <a:r>
-              <a:rPr lang="en-US" dirty="0" smtClean="0"/>
+              <a:rPr lang="en-US" dirty="0"/>
               <a:t>CSS Grid</a:t>
             </a:r>
-            <a:endParaRPr lang="en-US" dirty="0"/>
           </a:p>
         </p:txBody>
       </p:sp>
@@ -4932,53 +5393,39 @@
           <a:lstStyle/>
           <a:p>
             <a:r>
-              <a:rPr lang="en-US" dirty="0" smtClean="0"/>
+              <a:rPr lang="en-US" dirty="0"/>
               <a:t>Works from layout in</a:t>
             </a:r>
           </a:p>
           <a:p>
             <a:r>
-              <a:rPr lang="en-US" dirty="0" smtClean="0"/>
+              <a:rPr lang="en-US" dirty="0"/>
               <a:t>Great for macro elements/regions</a:t>
             </a:r>
-            <a:endParaRPr lang="en-US" dirty="0" smtClean="0"/>
-          </a:p>
-          <a:p>
-            <a:r>
-              <a:rPr lang="en-US" dirty="0" smtClean="0"/>
-              <a:t>2 </a:t>
-            </a:r>
-            <a:r>
-              <a:rPr lang="en-US" dirty="0" smtClean="0"/>
-              <a:t>dimensional layouts</a:t>
-            </a:r>
-          </a:p>
-          <a:p>
-            <a:r>
-              <a:rPr lang="en-US" dirty="0" smtClean="0"/>
-              <a:t>Full support just this </a:t>
-            </a:r>
-            <a:r>
-              <a:rPr lang="en-US" dirty="0" smtClean="0"/>
-              <a:t>year</a:t>
-            </a:r>
           </a:p>
           <a:p>
             <a:r>
               <a:rPr lang="en-US" dirty="0"/>
-              <a:t>Allows table-like </a:t>
-            </a:r>
-            <a:r>
-              <a:rPr lang="en-US" dirty="0" smtClean="0"/>
-              <a:t>support</a:t>
-            </a:r>
-          </a:p>
-          <a:p>
-            <a:r>
-              <a:rPr lang="en-US" dirty="0" smtClean="0"/>
+              <a:t>2 dimensional layouts</a:t>
+            </a:r>
+          </a:p>
+          <a:p>
+            <a:r>
+              <a:rPr lang="en-US" dirty="0"/>
+              <a:t>Full support just this year</a:t>
+            </a:r>
+          </a:p>
+          <a:p>
+            <a:r>
+              <a:rPr lang="en-US" dirty="0"/>
+              <a:t>Allows table-like support</a:t>
+            </a:r>
+          </a:p>
+          <a:p>
+            <a:r>
+              <a:rPr lang="en-US" dirty="0"/>
               <a:t>Second most searched</a:t>
             </a:r>
-            <a:endParaRPr lang="en-US" dirty="0"/>
           </a:p>
           <a:p>
             <a:endParaRPr lang="en-US" dirty="0"/>
@@ -4995,6 +5442,628 @@
   <p:clrMapOvr>
     <a:masterClrMapping/>
   </p:clrMapOvr>
+  <p:timing>
+    <p:tnLst>
+      <p:par>
+        <p:cTn id="1" dur="indefinite" restart="never" nodeType="tmRoot">
+          <p:childTnLst>
+            <p:seq concurrent="1" nextAc="seek">
+              <p:cTn id="2" dur="indefinite" nodeType="mainSeq">
+                <p:childTnLst>
+                  <p:par>
+                    <p:cTn id="3" fill="hold">
+                      <p:stCondLst>
+                        <p:cond delay="indefinite"/>
+                      </p:stCondLst>
+                      <p:childTnLst>
+                        <p:par>
+                          <p:cTn id="4" fill="hold">
+                            <p:stCondLst>
+                              <p:cond delay="0"/>
+                            </p:stCondLst>
+                            <p:childTnLst>
+                              <p:par>
+                                <p:cTn id="5" presetID="1" presetClass="entr" presetSubtype="0" fill="hold" grpId="0" nodeType="clickEffect">
+                                  <p:stCondLst>
+                                    <p:cond delay="0"/>
+                                  </p:stCondLst>
+                                  <p:childTnLst>
+                                    <p:set>
+                                      <p:cBhvr>
+                                        <p:cTn id="6" dur="1" fill="hold">
+                                          <p:stCondLst>
+                                            <p:cond delay="0"/>
+                                          </p:stCondLst>
+                                        </p:cTn>
+                                        <p:tgtEl>
+                                          <p:spTgt spid="7">
+                                            <p:txEl>
+                                              <p:pRg st="0" end="0"/>
+                                            </p:txEl>
+                                          </p:spTgt>
+                                        </p:tgtEl>
+                                        <p:attrNameLst>
+                                          <p:attrName>style.visibility</p:attrName>
+                                        </p:attrNameLst>
+                                      </p:cBhvr>
+                                      <p:to>
+                                        <p:strVal val="visible"/>
+                                      </p:to>
+                                    </p:set>
+                                  </p:childTnLst>
+                                </p:cTn>
+                              </p:par>
+                            </p:childTnLst>
+                          </p:cTn>
+                        </p:par>
+                      </p:childTnLst>
+                    </p:cTn>
+                  </p:par>
+                  <p:par>
+                    <p:cTn id="7" fill="hold">
+                      <p:stCondLst>
+                        <p:cond delay="indefinite"/>
+                      </p:stCondLst>
+                      <p:childTnLst>
+                        <p:par>
+                          <p:cTn id="8" fill="hold">
+                            <p:stCondLst>
+                              <p:cond delay="0"/>
+                            </p:stCondLst>
+                            <p:childTnLst>
+                              <p:par>
+                                <p:cTn id="9" presetID="1" presetClass="entr" presetSubtype="0" fill="hold" grpId="0" nodeType="clickEffect">
+                                  <p:stCondLst>
+                                    <p:cond delay="0"/>
+                                  </p:stCondLst>
+                                  <p:childTnLst>
+                                    <p:set>
+                                      <p:cBhvr>
+                                        <p:cTn id="10" dur="1" fill="hold">
+                                          <p:stCondLst>
+                                            <p:cond delay="0"/>
+                                          </p:stCondLst>
+                                        </p:cTn>
+                                        <p:tgtEl>
+                                          <p:spTgt spid="9">
+                                            <p:txEl>
+                                              <p:pRg st="0" end="0"/>
+                                            </p:txEl>
+                                          </p:spTgt>
+                                        </p:tgtEl>
+                                        <p:attrNameLst>
+                                          <p:attrName>style.visibility</p:attrName>
+                                        </p:attrNameLst>
+                                      </p:cBhvr>
+                                      <p:to>
+                                        <p:strVal val="visible"/>
+                                      </p:to>
+                                    </p:set>
+                                  </p:childTnLst>
+                                </p:cTn>
+                              </p:par>
+                            </p:childTnLst>
+                          </p:cTn>
+                        </p:par>
+                      </p:childTnLst>
+                    </p:cTn>
+                  </p:par>
+                  <p:par>
+                    <p:cTn id="11" fill="hold">
+                      <p:stCondLst>
+                        <p:cond delay="indefinite"/>
+                      </p:stCondLst>
+                      <p:childTnLst>
+                        <p:par>
+                          <p:cTn id="12" fill="hold">
+                            <p:stCondLst>
+                              <p:cond delay="0"/>
+                            </p:stCondLst>
+                            <p:childTnLst>
+                              <p:par>
+                                <p:cTn id="13" presetID="1" presetClass="entr" presetSubtype="0" fill="hold" grpId="0" nodeType="clickEffect">
+                                  <p:stCondLst>
+                                    <p:cond delay="0"/>
+                                  </p:stCondLst>
+                                  <p:childTnLst>
+                                    <p:set>
+                                      <p:cBhvr>
+                                        <p:cTn id="14" dur="1" fill="hold">
+                                          <p:stCondLst>
+                                            <p:cond delay="0"/>
+                                          </p:stCondLst>
+                                        </p:cTn>
+                                        <p:tgtEl>
+                                          <p:spTgt spid="7">
+                                            <p:txEl>
+                                              <p:pRg st="1" end="1"/>
+                                            </p:txEl>
+                                          </p:spTgt>
+                                        </p:tgtEl>
+                                        <p:attrNameLst>
+                                          <p:attrName>style.visibility</p:attrName>
+                                        </p:attrNameLst>
+                                      </p:cBhvr>
+                                      <p:to>
+                                        <p:strVal val="visible"/>
+                                      </p:to>
+                                    </p:set>
+                                  </p:childTnLst>
+                                </p:cTn>
+                              </p:par>
+                            </p:childTnLst>
+                          </p:cTn>
+                        </p:par>
+                      </p:childTnLst>
+                    </p:cTn>
+                  </p:par>
+                  <p:par>
+                    <p:cTn id="15" fill="hold">
+                      <p:stCondLst>
+                        <p:cond delay="indefinite"/>
+                      </p:stCondLst>
+                      <p:childTnLst>
+                        <p:par>
+                          <p:cTn id="16" fill="hold">
+                            <p:stCondLst>
+                              <p:cond delay="0"/>
+                            </p:stCondLst>
+                            <p:childTnLst>
+                              <p:par>
+                                <p:cTn id="17" presetID="1" presetClass="entr" presetSubtype="0" fill="hold" grpId="0" nodeType="clickEffect">
+                                  <p:stCondLst>
+                                    <p:cond delay="0"/>
+                                  </p:stCondLst>
+                                  <p:childTnLst>
+                                    <p:set>
+                                      <p:cBhvr>
+                                        <p:cTn id="18" dur="1" fill="hold">
+                                          <p:stCondLst>
+                                            <p:cond delay="0"/>
+                                          </p:stCondLst>
+                                        </p:cTn>
+                                        <p:tgtEl>
+                                          <p:spTgt spid="9">
+                                            <p:txEl>
+                                              <p:pRg st="1" end="1"/>
+                                            </p:txEl>
+                                          </p:spTgt>
+                                        </p:tgtEl>
+                                        <p:attrNameLst>
+                                          <p:attrName>style.visibility</p:attrName>
+                                        </p:attrNameLst>
+                                      </p:cBhvr>
+                                      <p:to>
+                                        <p:strVal val="visible"/>
+                                      </p:to>
+                                    </p:set>
+                                  </p:childTnLst>
+                                </p:cTn>
+                              </p:par>
+                            </p:childTnLst>
+                          </p:cTn>
+                        </p:par>
+                      </p:childTnLst>
+                    </p:cTn>
+                  </p:par>
+                  <p:par>
+                    <p:cTn id="19" fill="hold">
+                      <p:stCondLst>
+                        <p:cond delay="indefinite"/>
+                      </p:stCondLst>
+                      <p:childTnLst>
+                        <p:par>
+                          <p:cTn id="20" fill="hold">
+                            <p:stCondLst>
+                              <p:cond delay="0"/>
+                            </p:stCondLst>
+                            <p:childTnLst>
+                              <p:par>
+                                <p:cTn id="21" presetID="1" presetClass="entr" presetSubtype="0" fill="hold" grpId="0" nodeType="clickEffect">
+                                  <p:stCondLst>
+                                    <p:cond delay="0"/>
+                                  </p:stCondLst>
+                                  <p:childTnLst>
+                                    <p:set>
+                                      <p:cBhvr>
+                                        <p:cTn id="22" dur="1" fill="hold">
+                                          <p:stCondLst>
+                                            <p:cond delay="0"/>
+                                          </p:stCondLst>
+                                        </p:cTn>
+                                        <p:tgtEl>
+                                          <p:spTgt spid="7">
+                                            <p:txEl>
+                                              <p:pRg st="2" end="2"/>
+                                            </p:txEl>
+                                          </p:spTgt>
+                                        </p:tgtEl>
+                                        <p:attrNameLst>
+                                          <p:attrName>style.visibility</p:attrName>
+                                        </p:attrNameLst>
+                                      </p:cBhvr>
+                                      <p:to>
+                                        <p:strVal val="visible"/>
+                                      </p:to>
+                                    </p:set>
+                                  </p:childTnLst>
+                                </p:cTn>
+                              </p:par>
+                            </p:childTnLst>
+                          </p:cTn>
+                        </p:par>
+                      </p:childTnLst>
+                    </p:cTn>
+                  </p:par>
+                  <p:par>
+                    <p:cTn id="23" fill="hold">
+                      <p:stCondLst>
+                        <p:cond delay="indefinite"/>
+                      </p:stCondLst>
+                      <p:childTnLst>
+                        <p:par>
+                          <p:cTn id="24" fill="hold">
+                            <p:stCondLst>
+                              <p:cond delay="0"/>
+                            </p:stCondLst>
+                            <p:childTnLst>
+                              <p:par>
+                                <p:cTn id="25" presetID="1" presetClass="entr" presetSubtype="0" fill="hold" grpId="0" nodeType="clickEffect">
+                                  <p:stCondLst>
+                                    <p:cond delay="0"/>
+                                  </p:stCondLst>
+                                  <p:childTnLst>
+                                    <p:set>
+                                      <p:cBhvr>
+                                        <p:cTn id="26" dur="1" fill="hold">
+                                          <p:stCondLst>
+                                            <p:cond delay="0"/>
+                                          </p:stCondLst>
+                                        </p:cTn>
+                                        <p:tgtEl>
+                                          <p:spTgt spid="9">
+                                            <p:txEl>
+                                              <p:pRg st="2" end="2"/>
+                                            </p:txEl>
+                                          </p:spTgt>
+                                        </p:tgtEl>
+                                        <p:attrNameLst>
+                                          <p:attrName>style.visibility</p:attrName>
+                                        </p:attrNameLst>
+                                      </p:cBhvr>
+                                      <p:to>
+                                        <p:strVal val="visible"/>
+                                      </p:to>
+                                    </p:set>
+                                  </p:childTnLst>
+                                </p:cTn>
+                              </p:par>
+                            </p:childTnLst>
+                          </p:cTn>
+                        </p:par>
+                      </p:childTnLst>
+                    </p:cTn>
+                  </p:par>
+                  <p:par>
+                    <p:cTn id="27" fill="hold">
+                      <p:stCondLst>
+                        <p:cond delay="indefinite"/>
+                      </p:stCondLst>
+                      <p:childTnLst>
+                        <p:par>
+                          <p:cTn id="28" fill="hold">
+                            <p:stCondLst>
+                              <p:cond delay="0"/>
+                            </p:stCondLst>
+                            <p:childTnLst>
+                              <p:par>
+                                <p:cTn id="29" presetID="1" presetClass="entr" presetSubtype="0" fill="hold" grpId="0" nodeType="clickEffect">
+                                  <p:stCondLst>
+                                    <p:cond delay="0"/>
+                                  </p:stCondLst>
+                                  <p:childTnLst>
+                                    <p:set>
+                                      <p:cBhvr>
+                                        <p:cTn id="30" dur="1" fill="hold">
+                                          <p:stCondLst>
+                                            <p:cond delay="0"/>
+                                          </p:stCondLst>
+                                        </p:cTn>
+                                        <p:tgtEl>
+                                          <p:spTgt spid="7">
+                                            <p:txEl>
+                                              <p:pRg st="3" end="3"/>
+                                            </p:txEl>
+                                          </p:spTgt>
+                                        </p:tgtEl>
+                                        <p:attrNameLst>
+                                          <p:attrName>style.visibility</p:attrName>
+                                        </p:attrNameLst>
+                                      </p:cBhvr>
+                                      <p:to>
+                                        <p:strVal val="visible"/>
+                                      </p:to>
+                                    </p:set>
+                                  </p:childTnLst>
+                                </p:cTn>
+                              </p:par>
+                            </p:childTnLst>
+                          </p:cTn>
+                        </p:par>
+                      </p:childTnLst>
+                    </p:cTn>
+                  </p:par>
+                  <p:par>
+                    <p:cTn id="31" fill="hold">
+                      <p:stCondLst>
+                        <p:cond delay="indefinite"/>
+                      </p:stCondLst>
+                      <p:childTnLst>
+                        <p:par>
+                          <p:cTn id="32" fill="hold">
+                            <p:stCondLst>
+                              <p:cond delay="0"/>
+                            </p:stCondLst>
+                            <p:childTnLst>
+                              <p:par>
+                                <p:cTn id="33" presetID="1" presetClass="entr" presetSubtype="0" fill="hold" grpId="0" nodeType="clickEffect">
+                                  <p:stCondLst>
+                                    <p:cond delay="0"/>
+                                  </p:stCondLst>
+                                  <p:childTnLst>
+                                    <p:set>
+                                      <p:cBhvr>
+                                        <p:cTn id="34" dur="1" fill="hold">
+                                          <p:stCondLst>
+                                            <p:cond delay="0"/>
+                                          </p:stCondLst>
+                                        </p:cTn>
+                                        <p:tgtEl>
+                                          <p:spTgt spid="9">
+                                            <p:txEl>
+                                              <p:pRg st="3" end="3"/>
+                                            </p:txEl>
+                                          </p:spTgt>
+                                        </p:tgtEl>
+                                        <p:attrNameLst>
+                                          <p:attrName>style.visibility</p:attrName>
+                                        </p:attrNameLst>
+                                      </p:cBhvr>
+                                      <p:to>
+                                        <p:strVal val="visible"/>
+                                      </p:to>
+                                    </p:set>
+                                  </p:childTnLst>
+                                </p:cTn>
+                              </p:par>
+                            </p:childTnLst>
+                          </p:cTn>
+                        </p:par>
+                      </p:childTnLst>
+                    </p:cTn>
+                  </p:par>
+                  <p:par>
+                    <p:cTn id="35" fill="hold">
+                      <p:stCondLst>
+                        <p:cond delay="indefinite"/>
+                      </p:stCondLst>
+                      <p:childTnLst>
+                        <p:par>
+                          <p:cTn id="36" fill="hold">
+                            <p:stCondLst>
+                              <p:cond delay="0"/>
+                            </p:stCondLst>
+                            <p:childTnLst>
+                              <p:par>
+                                <p:cTn id="37" presetID="1" presetClass="entr" presetSubtype="0" fill="hold" grpId="0" nodeType="clickEffect">
+                                  <p:stCondLst>
+                                    <p:cond delay="0"/>
+                                  </p:stCondLst>
+                                  <p:childTnLst>
+                                    <p:set>
+                                      <p:cBhvr>
+                                        <p:cTn id="38" dur="1" fill="hold">
+                                          <p:stCondLst>
+                                            <p:cond delay="0"/>
+                                          </p:stCondLst>
+                                        </p:cTn>
+                                        <p:tgtEl>
+                                          <p:spTgt spid="7">
+                                            <p:txEl>
+                                              <p:pRg st="4" end="4"/>
+                                            </p:txEl>
+                                          </p:spTgt>
+                                        </p:tgtEl>
+                                        <p:attrNameLst>
+                                          <p:attrName>style.visibility</p:attrName>
+                                        </p:attrNameLst>
+                                      </p:cBhvr>
+                                      <p:to>
+                                        <p:strVal val="visible"/>
+                                      </p:to>
+                                    </p:set>
+                                  </p:childTnLst>
+                                </p:cTn>
+                              </p:par>
+                            </p:childTnLst>
+                          </p:cTn>
+                        </p:par>
+                      </p:childTnLst>
+                    </p:cTn>
+                  </p:par>
+                  <p:par>
+                    <p:cTn id="39" fill="hold">
+                      <p:stCondLst>
+                        <p:cond delay="indefinite"/>
+                      </p:stCondLst>
+                      <p:childTnLst>
+                        <p:par>
+                          <p:cTn id="40" fill="hold">
+                            <p:stCondLst>
+                              <p:cond delay="0"/>
+                            </p:stCondLst>
+                            <p:childTnLst>
+                              <p:par>
+                                <p:cTn id="41" presetID="1" presetClass="entr" presetSubtype="0" fill="hold" grpId="0" nodeType="clickEffect">
+                                  <p:stCondLst>
+                                    <p:cond delay="0"/>
+                                  </p:stCondLst>
+                                  <p:childTnLst>
+                                    <p:set>
+                                      <p:cBhvr>
+                                        <p:cTn id="42" dur="1" fill="hold">
+                                          <p:stCondLst>
+                                            <p:cond delay="0"/>
+                                          </p:stCondLst>
+                                        </p:cTn>
+                                        <p:tgtEl>
+                                          <p:spTgt spid="9">
+                                            <p:txEl>
+                                              <p:pRg st="4" end="4"/>
+                                            </p:txEl>
+                                          </p:spTgt>
+                                        </p:tgtEl>
+                                        <p:attrNameLst>
+                                          <p:attrName>style.visibility</p:attrName>
+                                        </p:attrNameLst>
+                                      </p:cBhvr>
+                                      <p:to>
+                                        <p:strVal val="visible"/>
+                                      </p:to>
+                                    </p:set>
+                                  </p:childTnLst>
+                                </p:cTn>
+                              </p:par>
+                            </p:childTnLst>
+                          </p:cTn>
+                        </p:par>
+                      </p:childTnLst>
+                    </p:cTn>
+                  </p:par>
+                  <p:par>
+                    <p:cTn id="43" fill="hold">
+                      <p:stCondLst>
+                        <p:cond delay="indefinite"/>
+                      </p:stCondLst>
+                      <p:childTnLst>
+                        <p:par>
+                          <p:cTn id="44" fill="hold">
+                            <p:stCondLst>
+                              <p:cond delay="0"/>
+                            </p:stCondLst>
+                            <p:childTnLst>
+                              <p:par>
+                                <p:cTn id="45" presetID="1" presetClass="entr" presetSubtype="0" fill="hold" grpId="0" nodeType="clickEffect">
+                                  <p:stCondLst>
+                                    <p:cond delay="0"/>
+                                  </p:stCondLst>
+                                  <p:childTnLst>
+                                    <p:set>
+                                      <p:cBhvr>
+                                        <p:cTn id="46" dur="1" fill="hold">
+                                          <p:stCondLst>
+                                            <p:cond delay="0"/>
+                                          </p:stCondLst>
+                                        </p:cTn>
+                                        <p:tgtEl>
+                                          <p:spTgt spid="7">
+                                            <p:txEl>
+                                              <p:pRg st="5" end="5"/>
+                                            </p:txEl>
+                                          </p:spTgt>
+                                        </p:tgtEl>
+                                        <p:attrNameLst>
+                                          <p:attrName>style.visibility</p:attrName>
+                                        </p:attrNameLst>
+                                      </p:cBhvr>
+                                      <p:to>
+                                        <p:strVal val="visible"/>
+                                      </p:to>
+                                    </p:set>
+                                  </p:childTnLst>
+                                </p:cTn>
+                              </p:par>
+                            </p:childTnLst>
+                          </p:cTn>
+                        </p:par>
+                      </p:childTnLst>
+                    </p:cTn>
+                  </p:par>
+                  <p:par>
+                    <p:cTn id="47" fill="hold">
+                      <p:stCondLst>
+                        <p:cond delay="indefinite"/>
+                      </p:stCondLst>
+                      <p:childTnLst>
+                        <p:par>
+                          <p:cTn id="48" fill="hold">
+                            <p:stCondLst>
+                              <p:cond delay="0"/>
+                            </p:stCondLst>
+                            <p:childTnLst>
+                              <p:par>
+                                <p:cTn id="49" presetID="1" presetClass="entr" presetSubtype="0" fill="hold" grpId="0" nodeType="clickEffect">
+                                  <p:stCondLst>
+                                    <p:cond delay="0"/>
+                                  </p:stCondLst>
+                                  <p:childTnLst>
+                                    <p:set>
+                                      <p:cBhvr>
+                                        <p:cTn id="50" dur="1" fill="hold">
+                                          <p:stCondLst>
+                                            <p:cond delay="0"/>
+                                          </p:stCondLst>
+                                        </p:cTn>
+                                        <p:tgtEl>
+                                          <p:spTgt spid="9">
+                                            <p:txEl>
+                                              <p:pRg st="5" end="5"/>
+                                            </p:txEl>
+                                          </p:spTgt>
+                                        </p:tgtEl>
+                                        <p:attrNameLst>
+                                          <p:attrName>style.visibility</p:attrName>
+                                        </p:attrNameLst>
+                                      </p:cBhvr>
+                                      <p:to>
+                                        <p:strVal val="visible"/>
+                                      </p:to>
+                                    </p:set>
+                                  </p:childTnLst>
+                                </p:cTn>
+                              </p:par>
+                            </p:childTnLst>
+                          </p:cTn>
+                        </p:par>
+                      </p:childTnLst>
+                    </p:cTn>
+                  </p:par>
+                </p:childTnLst>
+              </p:cTn>
+              <p:prevCondLst>
+                <p:cond evt="onPrev" delay="0">
+                  <p:tgtEl>
+                    <p:sldTgt/>
+                  </p:tgtEl>
+                </p:cond>
+              </p:prevCondLst>
+              <p:nextCondLst>
+                <p:cond evt="onNext" delay="0">
+                  <p:tgtEl>
+                    <p:sldTgt/>
+                  </p:tgtEl>
+                </p:cond>
+              </p:nextCondLst>
+            </p:seq>
+          </p:childTnLst>
+        </p:cTn>
+      </p:par>
+    </p:tnLst>
+    <p:bldLst>
+      <p:bldP spid="7" grpId="0" uiExpand="1" build="p"/>
+      <p:bldP spid="9" grpId="0" uiExpand="1" build="p"/>
+    </p:bldLst>
+  </p:timing>
 </p:sld>
 </file>
 
@@ -5031,10 +6100,9 @@
           <a:lstStyle/>
           <a:p>
             <a:r>
-              <a:rPr lang="en-US" dirty="0" smtClean="0"/>
+              <a:rPr lang="en-US" dirty="0"/>
               <a:t>Resources</a:t>
             </a:r>
-            <a:endParaRPr lang="en-US" dirty="0"/>
           </a:p>
         </p:txBody>
       </p:sp>
@@ -5082,30 +6150,18 @@
               <a:rPr lang="en-US" dirty="0">
                 <a:hlinkClick r:id="rId5"/>
               </a:rPr>
-              <a:t>https://</a:t>
-            </a:r>
-            <a:r>
-              <a:rPr lang="en-US" dirty="0" smtClean="0">
-                <a:hlinkClick r:id="rId5"/>
-              </a:rPr>
-              <a:t>codepen.io/osublake/full/dMLQJr</a:t>
-            </a:r>
-            <a:endParaRPr lang="en-US" dirty="0" smtClean="0">
+              <a:t>https://codepen.io/osublake/full/dMLQJr</a:t>
+            </a:r>
+            <a:endParaRPr lang="en-US" dirty="0">
               <a:hlinkClick r:id="rId6"/>
             </a:endParaRPr>
           </a:p>
           <a:p>
-            <a:r>
-              <a:rPr lang="en-US" dirty="0" smtClean="0">
-                <a:hlinkClick r:id="rId6"/>
-              </a:rPr>
-              <a:t>http</a:t>
-            </a:r>
             <a:r>
               <a:rPr lang="en-US" dirty="0">
                 <a:hlinkClick r:id="rId6"/>
               </a:rPr>
-              <a:t>://flexboxfroggy.com/</a:t>
+              <a:t>http://flexboxfroggy.com/</a:t>
             </a:r>
             <a:endParaRPr lang="en-US" dirty="0"/>
           </a:p>
@@ -5141,13 +6197,7 @@
               <a:rPr lang="en-US" dirty="0">
                 <a:hlinkClick r:id="rId10"/>
               </a:rPr>
-              <a:t>https://</a:t>
-            </a:r>
-            <a:r>
-              <a:rPr lang="en-US" dirty="0" smtClean="0">
-                <a:hlinkClick r:id="rId10"/>
-              </a:rPr>
-              <a:t>tutorialzine.com/2017/03/css-grid-vs-flexbox</a:t>
+              <a:t>https://tutorialzine.com/2017/03/css-grid-vs-flexbox</a:t>
             </a:r>
           </a:p>
           <a:p>
@@ -5157,12 +6207,9 @@
               </a:rPr>
               <a:t>http://bit.ly/css-grid-nebr-code</a:t>
             </a:r>
-            <a:endParaRPr lang="en-US" dirty="0" smtClean="0">
-              <a:hlinkClick r:id="rId10"/>
-            </a:endParaRPr>
-          </a:p>
-          <a:p>
-            <a:endParaRPr lang="en-US" dirty="0" smtClean="0"/>
+          </a:p>
+          <a:p>
+            <a:endParaRPr lang="en-US" dirty="0"/>
           </a:p>
           <a:p>
             <a:endParaRPr lang="en-US" dirty="0"/>
@@ -5240,7 +6287,7 @@
               <a:tabLst/>
             </a:pPr>
             <a:r>
-              <a:rPr kumimoji="0" lang="en-US" altLang="en-US" sz="900" b="0" i="0" u="none" strike="noStrike" cap="none" normalizeH="0" baseline="0" smtClean="0">
+              <a:rPr kumimoji="0" lang="en-US" altLang="en-US" sz="900" b="0" i="0" u="none" strike="noStrike" cap="none" normalizeH="0" baseline="0">
                 <a:ln>
                   <a:noFill/>
                 </a:ln>
@@ -5254,7 +6301,7 @@
               <a:t>http://bit.ly/css-grid-nebr-code</a:t>
             </a:r>
             <a:br>
-              <a:rPr kumimoji="0" lang="en-US" altLang="en-US" sz="900" b="0" i="0" u="none" strike="noStrike" cap="none" normalizeH="0" baseline="0" smtClean="0">
+              <a:rPr kumimoji="0" lang="en-US" altLang="en-US" sz="900" b="0" i="0" u="none" strike="noStrike" cap="none" normalizeH="0" baseline="0">
                 <a:ln>
                   <a:noFill/>
                 </a:ln>
@@ -5266,7 +6313,7 @@
                 <a:cs typeface="Arial" panose="020B0604020202020204" pitchFamily="34" charset="0"/>
               </a:rPr>
             </a:br>
-            <a:endParaRPr kumimoji="0" lang="en-US" altLang="en-US" sz="1800" b="0" i="0" u="none" strike="noStrike" cap="none" normalizeH="0" baseline="0" smtClean="0">
+            <a:endParaRPr kumimoji="0" lang="en-US" altLang="en-US" sz="1800" b="0" i="0" u="none" strike="noStrike" cap="none" normalizeH="0" baseline="0">
               <a:ln>
                 <a:noFill/>
               </a:ln>

</xml_diff>

<commit_message>
Finished with the css grid part as well, will have to do special cases tomorrow.
</commit_message>
<xml_diff>
--- a/Flexbox and Grid.pptx
+++ b/Flexbox and Grid.pptx
@@ -517,77 +517,8 @@
           <a:p>
             <a:r>
               <a:rPr lang="en-US" dirty="0"/>
-              <a:t>Before the 90’s –</a:t>
-            </a:r>
-            <a:r>
-              <a:rPr lang="en-US" baseline="0" dirty="0"/>
-              <a:t> Just had a terminal</a:t>
-            </a:r>
-          </a:p>
-          <a:p>
-            <a:r>
-              <a:rPr lang="en-US" baseline="0" dirty="0"/>
-              <a:t>Stacked Content – 1992 - layout looked pretty close to source, some images here and there inline or in its own space.</a:t>
-            </a:r>
-          </a:p>
-          <a:p>
-            <a:r>
-              <a:rPr lang="en-US" dirty="0"/>
-              <a:t>Tables –</a:t>
-            </a:r>
-            <a:r>
-              <a:rPr lang="en-US" baseline="0" dirty="0"/>
-              <a:t> 1995 – layouts became possible, spacing was allowed (with what could fit into 640x480) and bolder colors, images were more prominent</a:t>
-            </a:r>
-          </a:p>
-          <a:p>
-            <a:r>
-              <a:rPr lang="en-US" dirty="0"/>
-              <a:t>Flash – 1996</a:t>
-            </a:r>
-            <a:r>
-              <a:rPr lang="en-US" baseline="0" dirty="0"/>
-              <a:t> – Flash came along and when it comes to design it was absolutely amazing. You had a great deal more freedom than what was allowed with HTML up to that point. No SEO</a:t>
-            </a:r>
-          </a:p>
-          <a:p>
-            <a:r>
-              <a:rPr lang="en-US" baseline="0" dirty="0"/>
-              <a:t>CSS – 2000’s – CSS was our first opportunity to isolate our content from our styling and gave us a great deal more power in how we wanted our styling to look.</a:t>
-            </a:r>
-          </a:p>
-          <a:p>
-            <a:r>
-              <a:rPr lang="en-US" baseline="0" dirty="0"/>
-              <a:t>As CSS matured we got floats, and positioning and display types and a great deal more power with our structure.</a:t>
-            </a:r>
-          </a:p>
-          <a:p>
-            <a:r>
-              <a:rPr lang="en-US" baseline="0" dirty="0"/>
-              <a:t>Flexbox – Flexbox actually came out in 2006 by Firefox, it took 9 years to fully mature in 2015.</a:t>
-            </a:r>
-          </a:p>
-          <a:p>
-            <a:r>
-              <a:rPr lang="en-US" baseline="0" dirty="0"/>
-              <a:t>Frameworks – Since 2010 Frameworks such as Twitter Bootstrap and </a:t>
-            </a:r>
-            <a:r>
-              <a:rPr lang="en-US" baseline="0" dirty="0" err="1"/>
-              <a:t>Zurb</a:t>
-            </a:r>
-            <a:r>
-              <a:rPr lang="en-US" baseline="0" dirty="0"/>
-              <a:t> Foundation were very prominent with bootstrap being over 15 percent of the internet https://trends.builtwith.com/docinfo/Twitter-Bootstrap</a:t>
-            </a:r>
-          </a:p>
-          <a:p>
-            <a:r>
-              <a:rPr lang="en-US" baseline="0" dirty="0"/>
-              <a:t>Responsive – Using media queries responsive has become a standard with around half of the web traffic coming from mobile devices, it is important that various viewports are under consideration when making a site.</a:t>
-            </a:r>
-            <a:endParaRPr lang="en-US" dirty="0"/>
+              <a:t>Achieve layouts never before possible</a:t>
+            </a:r>
           </a:p>
         </p:txBody>
       </p:sp>
@@ -608,7 +539,7 @@
           <a:p>
             <a:fld id="{C5D4E551-1A58-3747-B1EC-993A1D0912CC}" type="slidenum">
               <a:rPr lang="en-US" smtClean="0"/>
-              <a:t>2</a:t>
+              <a:t>1</a:t>
             </a:fld>
             <a:endParaRPr lang="en-US"/>
           </a:p>
@@ -617,7 +548,7 @@
     </p:spTree>
     <p:extLst>
       <p:ext uri="{BB962C8B-B14F-4D97-AF65-F5344CB8AC3E}">
-        <p14:creationId xmlns:p14="http://schemas.microsoft.com/office/powerpoint/2010/main" val="4148359239"/>
+        <p14:creationId xmlns:p14="http://schemas.microsoft.com/office/powerpoint/2010/main" val="698884886"/>
       </p:ext>
     </p:extLst>
   </p:cSld>
@@ -673,6 +604,162 @@
           <a:p>
             <a:r>
               <a:rPr lang="en-US" dirty="0"/>
+              <a:t>Before the 90’s –</a:t>
+            </a:r>
+            <a:r>
+              <a:rPr lang="en-US" baseline="0" dirty="0"/>
+              <a:t> Just had a terminal</a:t>
+            </a:r>
+          </a:p>
+          <a:p>
+            <a:r>
+              <a:rPr lang="en-US" baseline="0" dirty="0"/>
+              <a:t>Stacked Content – 1992 - layout looked pretty close to source, some images here and there inline or in its own space.</a:t>
+            </a:r>
+          </a:p>
+          <a:p>
+            <a:r>
+              <a:rPr lang="en-US" dirty="0"/>
+              <a:t>Tables –</a:t>
+            </a:r>
+            <a:r>
+              <a:rPr lang="en-US" baseline="0" dirty="0"/>
+              <a:t> 1995 – layouts became possible, spacing was allowed (with what could fit into 640x480) and bolder colors, images were more prominent</a:t>
+            </a:r>
+          </a:p>
+          <a:p>
+            <a:r>
+              <a:rPr lang="en-US" dirty="0"/>
+              <a:t>Flash – 1996</a:t>
+            </a:r>
+            <a:r>
+              <a:rPr lang="en-US" baseline="0" dirty="0"/>
+              <a:t> – Flash came along and when it comes to design it was absolutely amazing. You had a great deal more freedom than what was allowed with HTML up to that point. No SEO</a:t>
+            </a:r>
+          </a:p>
+          <a:p>
+            <a:r>
+              <a:rPr lang="en-US" baseline="0" dirty="0"/>
+              <a:t>CSS – 2000’s – CSS was our first opportunity to isolate our content from our styling and gave us a great deal more power in how we wanted our styling to look.</a:t>
+            </a:r>
+          </a:p>
+          <a:p>
+            <a:r>
+              <a:rPr lang="en-US" baseline="0" dirty="0"/>
+              <a:t>As CSS matured we got floats, and positioning and display types and a great deal more power with our structure.</a:t>
+            </a:r>
+          </a:p>
+          <a:p>
+            <a:r>
+              <a:rPr lang="en-US" baseline="0" dirty="0"/>
+              <a:t>Flexbox – Flexbox actually came out in 2006 by Firefox, it took 9 years to fully mature in 2015.</a:t>
+            </a:r>
+          </a:p>
+          <a:p>
+            <a:r>
+              <a:rPr lang="en-US" baseline="0" dirty="0"/>
+              <a:t>Frameworks – Since 2010 Frameworks such as Twitter Bootstrap and </a:t>
+            </a:r>
+            <a:r>
+              <a:rPr lang="en-US" baseline="0" dirty="0" err="1"/>
+              <a:t>Zurb</a:t>
+            </a:r>
+            <a:r>
+              <a:rPr lang="en-US" baseline="0" dirty="0"/>
+              <a:t> Foundation were very prominent with bootstrap being over 15 percent of the internet https://trends.builtwith.com/docinfo/Twitter-Bootstrap</a:t>
+            </a:r>
+          </a:p>
+          <a:p>
+            <a:r>
+              <a:rPr lang="en-US" baseline="0" dirty="0"/>
+              <a:t>Responsive – Using media queries responsive has become a standard with around half of the web traffic coming from mobile devices, it is important that various viewports are under consideration when making a site.</a:t>
+            </a:r>
+            <a:endParaRPr lang="en-US" dirty="0"/>
+          </a:p>
+        </p:txBody>
+      </p:sp>
+      <p:sp>
+        <p:nvSpPr>
+          <p:cNvPr id="4" name="Slide Number Placeholder 3"/>
+          <p:cNvSpPr>
+            <a:spLocks noGrp="1"/>
+          </p:cNvSpPr>
+          <p:nvPr>
+            <p:ph type="sldNum" sz="quarter" idx="10"/>
+          </p:nvPr>
+        </p:nvSpPr>
+        <p:spPr/>
+        <p:txBody>
+          <a:bodyPr/>
+          <a:lstStyle/>
+          <a:p>
+            <a:fld id="{C5D4E551-1A58-3747-B1EC-993A1D0912CC}" type="slidenum">
+              <a:rPr lang="en-US" smtClean="0"/>
+              <a:t>2</a:t>
+            </a:fld>
+            <a:endParaRPr lang="en-US"/>
+          </a:p>
+        </p:txBody>
+      </p:sp>
+    </p:spTree>
+    <p:extLst>
+      <p:ext uri="{BB962C8B-B14F-4D97-AF65-F5344CB8AC3E}">
+        <p14:creationId xmlns:p14="http://schemas.microsoft.com/office/powerpoint/2010/main" val="4148359239"/>
+      </p:ext>
+    </p:extLst>
+  </p:cSld>
+  <p:clrMapOvr>
+    <a:masterClrMapping/>
+  </p:clrMapOvr>
+</p:notes>
+</file>
+
+<file path=ppt/notesSlides/notesSlide3.xml><?xml version="1.0" encoding="utf-8"?>
+<p:notes xmlns:a="http://schemas.openxmlformats.org/drawingml/2006/main" xmlns:r="http://schemas.openxmlformats.org/officeDocument/2006/relationships" xmlns:p="http://schemas.openxmlformats.org/presentationml/2006/main">
+  <p:cSld>
+    <p:spTree>
+      <p:nvGrpSpPr>
+        <p:cNvPr id="1" name=""/>
+        <p:cNvGrpSpPr/>
+        <p:nvPr/>
+      </p:nvGrpSpPr>
+      <p:grpSpPr>
+        <a:xfrm>
+          <a:off x="0" y="0"/>
+          <a:ext cx="0" cy="0"/>
+          <a:chOff x="0" y="0"/>
+          <a:chExt cx="0" cy="0"/>
+        </a:xfrm>
+      </p:grpSpPr>
+      <p:sp>
+        <p:nvSpPr>
+          <p:cNvPr id="2" name="Slide Image Placeholder 1"/>
+          <p:cNvSpPr>
+            <a:spLocks noGrp="1" noRot="1" noChangeAspect="1"/>
+          </p:cNvSpPr>
+          <p:nvPr>
+            <p:ph type="sldImg"/>
+          </p:nvPr>
+        </p:nvSpPr>
+        <p:spPr/>
+      </p:sp>
+      <p:sp>
+        <p:nvSpPr>
+          <p:cNvPr id="3" name="Notes Placeholder 2"/>
+          <p:cNvSpPr>
+            <a:spLocks noGrp="1"/>
+          </p:cNvSpPr>
+          <p:nvPr>
+            <p:ph type="body" idx="1"/>
+          </p:nvPr>
+        </p:nvSpPr>
+        <p:spPr/>
+        <p:txBody>
+          <a:bodyPr/>
+          <a:lstStyle/>
+          <a:p>
+            <a:r>
+              <a:rPr lang="en-US" dirty="0"/>
               <a:t>With Flexbox the content,</a:t>
             </a:r>
             <a:r>
@@ -762,7 +849,7 @@
 </p:notes>
 </file>
 
-<file path=ppt/notesSlides/notesSlide3.xml><?xml version="1.0" encoding="utf-8"?>
+<file path=ppt/notesSlides/notesSlide4.xml><?xml version="1.0" encoding="utf-8"?>
 <p:notes xmlns:a="http://schemas.openxmlformats.org/drawingml/2006/main" xmlns:r="http://schemas.openxmlformats.org/officeDocument/2006/relationships" xmlns:p="http://schemas.openxmlformats.org/presentationml/2006/main">
   <p:cSld>
     <p:spTree>
@@ -4600,8 +4687,8 @@
           </a:p>
           <a:p>
             <a:r>
-              <a:rPr lang="en-US">
-                <a:hlinkClick r:id="rId2"/>
+              <a:rPr lang="en-US" dirty="0">
+                <a:hlinkClick r:id="rId3"/>
               </a:rPr>
               <a:t>https://github.com/shellwe/Flexbox_Grid/</a:t>
             </a:r>
@@ -6124,7 +6211,7 @@
         </p:spPr>
         <p:txBody>
           <a:bodyPr>
-            <a:normAutofit/>
+            <a:normAutofit fontScale="92500" lnSpcReduction="10000"/>
           </a:bodyPr>
           <a:lstStyle/>
           <a:p>
@@ -6170,7 +6257,7 @@
               <a:rPr lang="en-US" dirty="0">
                 <a:hlinkClick r:id="rId7"/>
               </a:rPr>
-              <a:t>https://gridbyexample.com/</a:t>
+              <a:t>https://www.lynda.com/CSS-tutorials/Advanced-Responsive-Layouts-CSS-Flexbox/383780-2.html</a:t>
             </a:r>
             <a:endParaRPr lang="en-US" dirty="0"/>
           </a:p>
@@ -6179,7 +6266,7 @@
               <a:rPr lang="en-US" dirty="0">
                 <a:hlinkClick r:id="rId8"/>
               </a:rPr>
-              <a:t>https://css-tricks.com/snippets/css/complete-guide-grid/</a:t>
+              <a:t>https://gridbyexample.com/</a:t>
             </a:r>
             <a:endParaRPr lang="en-US" dirty="0"/>
           </a:p>
@@ -6188,7 +6275,7 @@
               <a:rPr lang="en-US" dirty="0">
                 <a:hlinkClick r:id="rId9"/>
               </a:rPr>
-              <a:t>http://cssgridgarden.com/</a:t>
+              <a:t>https://css-tricks.com/snippets/css/complete-guide-grid/</a:t>
             </a:r>
             <a:endParaRPr lang="en-US" dirty="0"/>
           </a:p>
@@ -6197,13 +6284,22 @@
               <a:rPr lang="en-US" dirty="0">
                 <a:hlinkClick r:id="rId10"/>
               </a:rPr>
+              <a:t>http://cssgridgarden.com/</a:t>
+            </a:r>
+            <a:endParaRPr lang="en-US" dirty="0"/>
+          </a:p>
+          <a:p>
+            <a:r>
+              <a:rPr lang="en-US" dirty="0">
+                <a:hlinkClick r:id="rId11"/>
+              </a:rPr>
               <a:t>https://tutorialzine.com/2017/03/css-grid-vs-flexbox</a:t>
             </a:r>
           </a:p>
           <a:p>
             <a:r>
               <a:rPr lang="en-US" dirty="0">
-                <a:hlinkClick r:id="rId10"/>
+                <a:hlinkClick r:id="rId11"/>
               </a:rPr>
               <a:t>http://bit.ly/css-grid-nebr-code</a:t>
             </a:r>

</xml_diff>

<commit_message>
All set up for presentation, I think.
</commit_message>
<xml_diff>
--- a/Flexbox and Grid.pptx
+++ b/Flexbox and Grid.pptx
@@ -204,7 +204,7 @@
           <a:p>
             <a:fld id="{3D2B48DD-5806-E040-BB46-CF7EF7496337}" type="datetimeFigureOut">
               <a:rPr lang="en-US" smtClean="0"/>
-              <a:t>10/24/2017</a:t>
+              <a:t>10/25/2017</a:t>
             </a:fld>
             <a:endParaRPr lang="en-US"/>
           </a:p>
@@ -517,7 +517,68 @@
           <a:p>
             <a:r>
               <a:rPr lang="en-US" dirty="0"/>
-              <a:t>Achieve layouts never before possible</a:t>
+              <a:t>Achieve layouts never before </a:t>
+            </a:r>
+            <a:r>
+              <a:rPr lang="en-US" dirty="0" smtClean="0"/>
+              <a:t>possible</a:t>
+            </a:r>
+          </a:p>
+          <a:p>
+            <a:endParaRPr lang="en-US" dirty="0" smtClean="0"/>
+          </a:p>
+          <a:p>
+            <a:pPr rtl="0" fontAlgn="base"/>
+            <a:r>
+              <a:rPr lang="en-US" sz="1200" b="0" i="0" u="none" strike="noStrike" kern="1200" dirty="0" smtClean="0">
+                <a:solidFill>
+                  <a:schemeClr val="tx1"/>
+                </a:solidFill>
+                <a:effectLst/>
+                <a:latin typeface="+mn-lt"/>
+                <a:ea typeface="+mn-ea"/>
+                <a:cs typeface="+mn-cs"/>
+              </a:rPr>
+              <a:t>Only first level descendants are placed on the </a:t>
+            </a:r>
+            <a:r>
+              <a:rPr lang="en-US" sz="1200" b="0" i="0" u="none" strike="noStrike" kern="1200" smtClean="0">
+                <a:solidFill>
+                  <a:schemeClr val="tx1"/>
+                </a:solidFill>
+                <a:effectLst/>
+                <a:latin typeface="+mn-lt"/>
+                <a:ea typeface="+mn-ea"/>
+                <a:cs typeface="+mn-cs"/>
+              </a:rPr>
+              <a:t>grid.</a:t>
+            </a:r>
+          </a:p>
+          <a:p>
+            <a:pPr rtl="0" fontAlgn="base"/>
+            <a:endParaRPr lang="en-US" sz="1200" b="0" i="0" u="none" strike="noStrike" kern="1200" dirty="0" smtClean="0">
+              <a:solidFill>
+                <a:schemeClr val="tx1"/>
+              </a:solidFill>
+              <a:effectLst/>
+              <a:latin typeface="+mn-lt"/>
+              <a:ea typeface="+mn-ea"/>
+              <a:cs typeface="+mn-cs"/>
+            </a:endParaRPr>
+          </a:p>
+          <a:p>
+            <a:pPr rtl="0" fontAlgn="base"/>
+            <a:r>
+              <a:rPr lang="en-US" sz="1200" b="0" i="0" u="none" strike="noStrike" kern="1200" dirty="0" smtClean="0">
+                <a:solidFill>
+                  <a:schemeClr val="tx1"/>
+                </a:solidFill>
+                <a:effectLst/>
+                <a:latin typeface="+mn-lt"/>
+                <a:ea typeface="+mn-ea"/>
+                <a:cs typeface="+mn-cs"/>
+              </a:rPr>
+              <a:t>For the first time ever you have much greater flexibility when changing your design without having to restructure your code.</a:t>
             </a:r>
           </a:p>
         </p:txBody>
@@ -769,10 +830,24 @@
             <a:endParaRPr lang="en-US" dirty="0"/>
           </a:p>
           <a:p>
+            <a:endParaRPr lang="en-US" dirty="0" smtClean="0"/>
+          </a:p>
+          <a:p>
+            <a:r>
+              <a:rPr lang="en-US" dirty="0" smtClean="0"/>
+              <a:t>Similar </a:t>
+            </a:r>
             <a:r>
               <a:rPr lang="en-US" dirty="0"/>
-              <a:t>Similar items – lists of items</a:t>
-            </a:r>
+              <a:t>items – lists of </a:t>
+            </a:r>
+            <a:r>
+              <a:rPr lang="en-US" dirty="0" smtClean="0"/>
+              <a:t>items</a:t>
+            </a:r>
+          </a:p>
+          <a:p>
+            <a:endParaRPr lang="en-US" dirty="0"/>
           </a:p>
           <a:p>
             <a:r>
@@ -781,24 +856,29 @@
             </a:r>
             <a:r>
               <a:rPr lang="en-US" baseline="0" dirty="0"/>
-              <a:t> header, footer, aside, content</a:t>
-            </a:r>
-            <a:endParaRPr lang="en-US" dirty="0"/>
-          </a:p>
-          <a:p>
-            <a:endParaRPr lang="en-US" dirty="0"/>
-          </a:p>
-          <a:p>
-            <a:endParaRPr lang="en-US" dirty="0"/>
-          </a:p>
-          <a:p>
-            <a:r>
-              <a:rPr lang="en-US" dirty="0"/>
+              <a:t> header, footer, aside, </a:t>
+            </a:r>
+            <a:r>
+              <a:rPr lang="en-US" baseline="0" dirty="0" smtClean="0"/>
+              <a:t>content</a:t>
+            </a:r>
+            <a:endParaRPr lang="en-US" dirty="0" smtClean="0"/>
+          </a:p>
+          <a:p>
+            <a:endParaRPr lang="en-US" dirty="0" smtClean="0"/>
+          </a:p>
+          <a:p>
+            <a:r>
+              <a:rPr lang="en-US" dirty="0" smtClean="0"/>
               <a:t>GRID</a:t>
             </a:r>
             <a:r>
+              <a:rPr lang="en-US" baseline="0" dirty="0" smtClean="0"/>
+              <a:t> </a:t>
+            </a:r>
+            <a:r>
               <a:rPr lang="en-US" baseline="0" dirty="0"/>
-              <a:t> – IE 10+11 supports 2011 spec</a:t>
+              <a:t>– IE 10+11 supports 2011 spec</a:t>
             </a:r>
           </a:p>
           <a:p>
@@ -807,9 +887,12 @@
           <a:p>
             <a:r>
               <a:rPr lang="en-US" baseline="0" dirty="0"/>
-              <a:t>Table-like support but separating content and presentation</a:t>
-            </a:r>
-            <a:endParaRPr lang="en-US" dirty="0"/>
+              <a:t>Table-like support but separating content and </a:t>
+            </a:r>
+            <a:r>
+              <a:rPr lang="en-US" baseline="0" dirty="0" smtClean="0"/>
+              <a:t>presentation</a:t>
+            </a:r>
           </a:p>
         </p:txBody>
       </p:sp>
@@ -1118,7 +1201,7 @@
             <a:fld id="{87DE6118-2437-4B30-8E3C-4D2BE6020583}" type="datetimeFigureOut">
               <a:rPr lang="en-US" dirty="0"/>
               <a:pPr/>
-              <a:t>10/24/2017</a:t>
+              <a:t>10/25/2017</a:t>
             </a:fld>
             <a:endParaRPr lang="en-US" dirty="0"/>
           </a:p>
@@ -1444,7 +1527,7 @@
           <a:p>
             <a:fld id="{87DE6118-2437-4B30-8E3C-4D2BE6020583}" type="datetimeFigureOut">
               <a:rPr lang="en-US" dirty="0"/>
-              <a:t>10/24/2017</a:t>
+              <a:t>10/25/2017</a:t>
             </a:fld>
             <a:endParaRPr lang="en-US" dirty="0"/>
           </a:p>
@@ -1619,7 +1702,7 @@
           <a:p>
             <a:fld id="{87DE6118-2437-4B30-8E3C-4D2BE6020583}" type="datetimeFigureOut">
               <a:rPr lang="en-US" dirty="0"/>
-              <a:t>10/24/2017</a:t>
+              <a:t>10/25/2017</a:t>
             </a:fld>
             <a:endParaRPr lang="en-US" dirty="0"/>
           </a:p>
@@ -1784,7 +1867,7 @@
           <a:p>
             <a:fld id="{87DE6118-2437-4B30-8E3C-4D2BE6020583}" type="datetimeFigureOut">
               <a:rPr lang="en-US" dirty="0"/>
-              <a:t>10/24/2017</a:t>
+              <a:t>10/25/2017</a:t>
             </a:fld>
             <a:endParaRPr lang="en-US" dirty="0"/>
           </a:p>
@@ -2057,7 +2140,7 @@
             <a:fld id="{87DE6118-2437-4B30-8E3C-4D2BE6020583}" type="datetimeFigureOut">
               <a:rPr lang="en-US" dirty="0"/>
               <a:pPr/>
-              <a:t>10/24/2017</a:t>
+              <a:t>10/25/2017</a:t>
             </a:fld>
             <a:endParaRPr lang="en-US" dirty="0"/>
           </a:p>
@@ -2447,7 +2530,7 @@
           <a:p>
             <a:fld id="{87DE6118-2437-4B30-8E3C-4D2BE6020583}" type="datetimeFigureOut">
               <a:rPr lang="en-US" dirty="0"/>
-              <a:t>10/24/2017</a:t>
+              <a:t>10/25/2017</a:t>
             </a:fld>
             <a:endParaRPr lang="en-US" dirty="0"/>
           </a:p>
@@ -2919,7 +3002,7 @@
           <a:p>
             <a:fld id="{87DE6118-2437-4B30-8E3C-4D2BE6020583}" type="datetimeFigureOut">
               <a:rPr lang="en-US" dirty="0"/>
-              <a:t>10/24/2017</a:t>
+              <a:t>10/25/2017</a:t>
             </a:fld>
             <a:endParaRPr lang="en-US" dirty="0"/>
           </a:p>
@@ -3032,7 +3115,7 @@
           <a:p>
             <a:fld id="{87DE6118-2437-4B30-8E3C-4D2BE6020583}" type="datetimeFigureOut">
               <a:rPr lang="en-US" dirty="0"/>
-              <a:t>10/24/2017</a:t>
+              <a:t>10/25/2017</a:t>
             </a:fld>
             <a:endParaRPr lang="en-US" dirty="0"/>
           </a:p>
@@ -3122,7 +3205,7 @@
           <a:p>
             <a:fld id="{87DE6118-2437-4B30-8E3C-4D2BE6020583}" type="datetimeFigureOut">
               <a:rPr lang="en-US" dirty="0"/>
-              <a:t>10/24/2017</a:t>
+              <a:t>10/25/2017</a:t>
             </a:fld>
             <a:endParaRPr lang="en-US" dirty="0"/>
           </a:p>
@@ -3464,7 +3547,7 @@
             <a:fld id="{87DE6118-2437-4B30-8E3C-4D2BE6020583}" type="datetimeFigureOut">
               <a:rPr lang="en-US" dirty="0"/>
               <a:pPr/>
-              <a:t>10/24/2017</a:t>
+              <a:t>10/25/2017</a:t>
             </a:fld>
             <a:endParaRPr lang="en-US" dirty="0"/>
           </a:p>
@@ -3849,7 +3932,7 @@
             <a:fld id="{87DE6118-2437-4B30-8E3C-4D2BE6020583}" type="datetimeFigureOut">
               <a:rPr lang="en-US" dirty="0"/>
               <a:pPr/>
-              <a:t>10/24/2017</a:t>
+              <a:t>10/25/2017</a:t>
             </a:fld>
             <a:endParaRPr lang="en-US" dirty="0"/>
           </a:p>
@@ -4124,7 +4207,7 @@
             <a:fld id="{87DE6118-2437-4B30-8E3C-4D2BE6020583}" type="datetimeFigureOut">
               <a:rPr lang="en-US" dirty="0"/>
               <a:pPr/>
-              <a:t>10/24/2017</a:t>
+              <a:t>10/25/2017</a:t>
             </a:fld>
             <a:endParaRPr lang="en-US" dirty="0"/>
           </a:p>
@@ -4706,6 +4789,25 @@
   <p:clrMapOvr>
     <a:masterClrMapping/>
   </p:clrMapOvr>
+  <mc:AlternateContent xmlns:mc="http://schemas.openxmlformats.org/markup-compatibility/2006">
+    <mc:Choice xmlns:p14="http://schemas.microsoft.com/office/powerpoint/2010/main" Requires="p14">
+      <p:transition spd="slow" p14:dur="2500">
+        <p:checker/>
+      </p:transition>
+    </mc:Choice>
+    <mc:Fallback>
+      <p:transition spd="slow">
+        <p:checker/>
+      </p:transition>
+    </mc:Fallback>
+  </mc:AlternateContent>
+  <p:timing>
+    <p:tnLst>
+      <p:par>
+        <p:cTn id="1" dur="indefinite" restart="never" nodeType="tmRoot"/>
+      </p:par>
+    </p:tnLst>
+  </p:timing>
 </p:sld>
 </file>
 
@@ -4838,6 +4940,18 @@
   <p:clrMapOvr>
     <a:masterClrMapping/>
   </p:clrMapOvr>
+  <mc:AlternateContent xmlns:mc="http://schemas.openxmlformats.org/markup-compatibility/2006">
+    <mc:Choice xmlns:p14="http://schemas.microsoft.com/office/powerpoint/2010/main" Requires="p14">
+      <p:transition spd="slow" p14:dur="2500">
+        <p:checker/>
+      </p:transition>
+    </mc:Choice>
+    <mc:Fallback>
+      <p:transition spd="slow">
+        <p:checker/>
+      </p:transition>
+    </mc:Fallback>
+  </mc:AlternateContent>
   <p:timing>
     <p:tnLst>
       <p:par>
@@ -5529,6 +5643,18 @@
   <p:clrMapOvr>
     <a:masterClrMapping/>
   </p:clrMapOvr>
+  <mc:AlternateContent xmlns:mc="http://schemas.openxmlformats.org/markup-compatibility/2006">
+    <mc:Choice xmlns:p14="http://schemas.microsoft.com/office/powerpoint/2010/main" Requires="p14">
+      <p:transition spd="slow" p14:dur="2500">
+        <p:checker/>
+      </p:transition>
+    </mc:Choice>
+    <mc:Fallback>
+      <p:transition spd="slow">
+        <p:checker/>
+      </p:transition>
+    </mc:Fallback>
+  </mc:AlternateContent>
   <p:timing>
     <p:tnLst>
       <p:par>
@@ -6432,6 +6558,25 @@
   <p:clrMapOvr>
     <a:masterClrMapping/>
   </p:clrMapOvr>
+  <mc:AlternateContent xmlns:mc="http://schemas.openxmlformats.org/markup-compatibility/2006">
+    <mc:Choice xmlns:p14="http://schemas.microsoft.com/office/powerpoint/2010/main" Requires="p14">
+      <p:transition spd="slow" p14:dur="2500">
+        <p:checker/>
+      </p:transition>
+    </mc:Choice>
+    <mc:Fallback>
+      <p:transition spd="slow">
+        <p:checker/>
+      </p:transition>
+    </mc:Fallback>
+  </mc:AlternateContent>
+  <p:timing>
+    <p:tnLst>
+      <p:par>
+        <p:cTn id="1" dur="indefinite" restart="never" nodeType="tmRoot"/>
+      </p:par>
+    </p:tnLst>
+  </p:timing>
 </p:sld>
 </file>
 

</xml_diff>